<commit_message>
edited powerpoint, added reference model and demo to readme
</commit_message>
<xml_diff>
--- a/Presentation/RaspberryReef.pptx
+++ b/Presentation/RaspberryReef.pptx
@@ -4,8 +4,15 @@
   <p:sldMasterIdLst>
     <p:sldMasterId id="2147483648" r:id="rId1"/>
   </p:sldMasterIdLst>
+  <p:notesMasterIdLst>
+    <p:notesMasterId r:id="rId7"/>
+  </p:notesMasterIdLst>
   <p:sldIdLst>
     <p:sldId id="256" r:id="rId2"/>
+    <p:sldId id="257" r:id="rId3"/>
+    <p:sldId id="258" r:id="rId4"/>
+    <p:sldId id="260" r:id="rId5"/>
+    <p:sldId id="259" r:id="rId6"/>
   </p:sldIdLst>
   <p:sldSz cx="12192000" cy="6858000"/>
   <p:notesSz cx="6858000" cy="9144000"/>
@@ -104,7 +111,446 @@
       </a:defRPr>
     </a:lvl9pPr>
   </p:defaultTextStyle>
+  <p:extLst>
+    <p:ext uri="{EFAFB233-063F-42B5-8137-9DF3F51BA10A}">
+      <p15:sldGuideLst xmlns:p15="http://schemas.microsoft.com/office/powerpoint/2012/main"/>
+    </p:ext>
+  </p:extLst>
 </p:presentation>
+</file>
+
+<file path=ppt/notesMasters/notesMaster1.xml><?xml version="1.0" encoding="utf-8"?>
+<p:notesMaster xmlns:a="http://schemas.openxmlformats.org/drawingml/2006/main" xmlns:r="http://schemas.openxmlformats.org/officeDocument/2006/relationships" xmlns:p="http://schemas.openxmlformats.org/presentationml/2006/main">
+  <p:cSld>
+    <p:bg>
+      <p:bgRef idx="1001">
+        <a:schemeClr val="bg1"/>
+      </p:bgRef>
+    </p:bg>
+    <p:spTree>
+      <p:nvGrpSpPr>
+        <p:cNvPr id="1" name=""/>
+        <p:cNvGrpSpPr/>
+        <p:nvPr/>
+      </p:nvGrpSpPr>
+      <p:grpSpPr>
+        <a:xfrm>
+          <a:off x="0" y="0"/>
+          <a:ext cx="0" cy="0"/>
+          <a:chOff x="0" y="0"/>
+          <a:chExt cx="0" cy="0"/>
+        </a:xfrm>
+      </p:grpSpPr>
+      <p:sp>
+        <p:nvSpPr>
+          <p:cNvPr id="2" name="Kopfzeilenplatzhalter 1"/>
+          <p:cNvSpPr>
+            <a:spLocks noGrp="1"/>
+          </p:cNvSpPr>
+          <p:nvPr>
+            <p:ph type="hdr" sz="quarter"/>
+          </p:nvPr>
+        </p:nvSpPr>
+        <p:spPr>
+          <a:xfrm>
+            <a:off x="0" y="0"/>
+            <a:ext cx="2971800" cy="458788"/>
+          </a:xfrm>
+          <a:prstGeom prst="rect">
+            <a:avLst/>
+          </a:prstGeom>
+        </p:spPr>
+        <p:txBody>
+          <a:bodyPr vert="horz" lIns="91440" tIns="45720" rIns="91440" bIns="45720" rtlCol="0"/>
+          <a:lstStyle>
+            <a:lvl1pPr algn="l">
+              <a:defRPr sz="1200"/>
+            </a:lvl1pPr>
+          </a:lstStyle>
+          <a:p>
+            <a:endParaRPr lang="de-CH"/>
+          </a:p>
+        </p:txBody>
+      </p:sp>
+      <p:sp>
+        <p:nvSpPr>
+          <p:cNvPr id="3" name="Datumsplatzhalter 2"/>
+          <p:cNvSpPr>
+            <a:spLocks noGrp="1"/>
+          </p:cNvSpPr>
+          <p:nvPr>
+            <p:ph type="dt" idx="1"/>
+          </p:nvPr>
+        </p:nvSpPr>
+        <p:spPr>
+          <a:xfrm>
+            <a:off x="3884613" y="0"/>
+            <a:ext cx="2971800" cy="458788"/>
+          </a:xfrm>
+          <a:prstGeom prst="rect">
+            <a:avLst/>
+          </a:prstGeom>
+        </p:spPr>
+        <p:txBody>
+          <a:bodyPr vert="horz" lIns="91440" tIns="45720" rIns="91440" bIns="45720" rtlCol="0"/>
+          <a:lstStyle>
+            <a:lvl1pPr algn="r">
+              <a:defRPr sz="1200"/>
+            </a:lvl1pPr>
+          </a:lstStyle>
+          <a:p>
+            <a:fld id="{4B25A520-98E1-45AC-B3FE-2C5B0D40242F}" type="datetimeFigureOut">
+              <a:rPr lang="de-CH" smtClean="0"/>
+              <a:t>12.01.2020</a:t>
+            </a:fld>
+            <a:endParaRPr lang="de-CH"/>
+          </a:p>
+        </p:txBody>
+      </p:sp>
+      <p:sp>
+        <p:nvSpPr>
+          <p:cNvPr id="4" name="Folienbildplatzhalter 3"/>
+          <p:cNvSpPr>
+            <a:spLocks noGrp="1" noRot="1" noChangeAspect="1"/>
+          </p:cNvSpPr>
+          <p:nvPr>
+            <p:ph type="sldImg" idx="2"/>
+          </p:nvPr>
+        </p:nvSpPr>
+        <p:spPr>
+          <a:xfrm>
+            <a:off x="685800" y="1143000"/>
+            <a:ext cx="5486400" cy="3086100"/>
+          </a:xfrm>
+          <a:prstGeom prst="rect">
+            <a:avLst/>
+          </a:prstGeom>
+          <a:noFill/>
+          <a:ln w="12700">
+            <a:solidFill>
+              <a:prstClr val="black"/>
+            </a:solidFill>
+          </a:ln>
+        </p:spPr>
+        <p:txBody>
+          <a:bodyPr vert="horz" lIns="91440" tIns="45720" rIns="91440" bIns="45720" rtlCol="0" anchor="ctr"/>
+          <a:lstStyle/>
+          <a:p>
+            <a:endParaRPr lang="de-CH"/>
+          </a:p>
+        </p:txBody>
+      </p:sp>
+      <p:sp>
+        <p:nvSpPr>
+          <p:cNvPr id="5" name="Notizenplatzhalter 4"/>
+          <p:cNvSpPr>
+            <a:spLocks noGrp="1"/>
+          </p:cNvSpPr>
+          <p:nvPr>
+            <p:ph type="body" sz="quarter" idx="3"/>
+          </p:nvPr>
+        </p:nvSpPr>
+        <p:spPr>
+          <a:xfrm>
+            <a:off x="685800" y="4400550"/>
+            <a:ext cx="5486400" cy="3600450"/>
+          </a:xfrm>
+          <a:prstGeom prst="rect">
+            <a:avLst/>
+          </a:prstGeom>
+        </p:spPr>
+        <p:txBody>
+          <a:bodyPr vert="horz" lIns="91440" tIns="45720" rIns="91440" bIns="45720" rtlCol="0"/>
+          <a:lstStyle/>
+          <a:p>
+            <a:pPr lvl="0"/>
+            <a:r>
+              <a:rPr lang="de-DE"/>
+              <a:t>Mastertextformat bearbeiten</a:t>
+            </a:r>
+          </a:p>
+          <a:p>
+            <a:pPr lvl="1"/>
+            <a:r>
+              <a:rPr lang="de-DE"/>
+              <a:t>Zweite Ebene</a:t>
+            </a:r>
+          </a:p>
+          <a:p>
+            <a:pPr lvl="2"/>
+            <a:r>
+              <a:rPr lang="de-DE"/>
+              <a:t>Dritte Ebene</a:t>
+            </a:r>
+          </a:p>
+          <a:p>
+            <a:pPr lvl="3"/>
+            <a:r>
+              <a:rPr lang="de-DE"/>
+              <a:t>Vierte Ebene</a:t>
+            </a:r>
+          </a:p>
+          <a:p>
+            <a:pPr lvl="4"/>
+            <a:r>
+              <a:rPr lang="de-DE"/>
+              <a:t>Fünfte Ebene</a:t>
+            </a:r>
+            <a:endParaRPr lang="de-CH"/>
+          </a:p>
+        </p:txBody>
+      </p:sp>
+      <p:sp>
+        <p:nvSpPr>
+          <p:cNvPr id="6" name="Fußzeilenplatzhalter 5"/>
+          <p:cNvSpPr>
+            <a:spLocks noGrp="1"/>
+          </p:cNvSpPr>
+          <p:nvPr>
+            <p:ph type="ftr" sz="quarter" idx="4"/>
+          </p:nvPr>
+        </p:nvSpPr>
+        <p:spPr>
+          <a:xfrm>
+            <a:off x="0" y="8685213"/>
+            <a:ext cx="2971800" cy="458787"/>
+          </a:xfrm>
+          <a:prstGeom prst="rect">
+            <a:avLst/>
+          </a:prstGeom>
+        </p:spPr>
+        <p:txBody>
+          <a:bodyPr vert="horz" lIns="91440" tIns="45720" rIns="91440" bIns="45720" rtlCol="0" anchor="b"/>
+          <a:lstStyle>
+            <a:lvl1pPr algn="l">
+              <a:defRPr sz="1200"/>
+            </a:lvl1pPr>
+          </a:lstStyle>
+          <a:p>
+            <a:endParaRPr lang="de-CH"/>
+          </a:p>
+        </p:txBody>
+      </p:sp>
+      <p:sp>
+        <p:nvSpPr>
+          <p:cNvPr id="7" name="Foliennummernplatzhalter 6"/>
+          <p:cNvSpPr>
+            <a:spLocks noGrp="1"/>
+          </p:cNvSpPr>
+          <p:nvPr>
+            <p:ph type="sldNum" sz="quarter" idx="5"/>
+          </p:nvPr>
+        </p:nvSpPr>
+        <p:spPr>
+          <a:xfrm>
+            <a:off x="3884613" y="8685213"/>
+            <a:ext cx="2971800" cy="458787"/>
+          </a:xfrm>
+          <a:prstGeom prst="rect">
+            <a:avLst/>
+          </a:prstGeom>
+        </p:spPr>
+        <p:txBody>
+          <a:bodyPr vert="horz" lIns="91440" tIns="45720" rIns="91440" bIns="45720" rtlCol="0" anchor="b"/>
+          <a:lstStyle>
+            <a:lvl1pPr algn="r">
+              <a:defRPr sz="1200"/>
+            </a:lvl1pPr>
+          </a:lstStyle>
+          <a:p>
+            <a:fld id="{D157F58D-6983-4C8C-A011-E2CD251AFCB8}" type="slidenum">
+              <a:rPr lang="de-CH" smtClean="0"/>
+              <a:t>‹Nr.›</a:t>
+            </a:fld>
+            <a:endParaRPr lang="de-CH"/>
+          </a:p>
+        </p:txBody>
+      </p:sp>
+    </p:spTree>
+    <p:extLst>
+      <p:ext uri="{BB962C8B-B14F-4D97-AF65-F5344CB8AC3E}">
+        <p14:creationId xmlns:p14="http://schemas.microsoft.com/office/powerpoint/2010/main" val="247720652"/>
+      </p:ext>
+    </p:extLst>
+  </p:cSld>
+  <p:clrMap bg1="lt1" tx1="dk1" bg2="lt2" tx2="dk2" accent1="accent1" accent2="accent2" accent3="accent3" accent4="accent4" accent5="accent5" accent6="accent6" hlink="hlink" folHlink="folHlink"/>
+  <p:notesStyle>
+    <a:lvl1pPr marL="0" algn="l" defTabSz="914400" rtl="0" eaLnBrk="1" latinLnBrk="0" hangingPunct="1">
+      <a:defRPr sz="1200" kern="1200">
+        <a:solidFill>
+          <a:schemeClr val="tx1"/>
+        </a:solidFill>
+        <a:latin typeface="+mn-lt"/>
+        <a:ea typeface="+mn-ea"/>
+        <a:cs typeface="+mn-cs"/>
+      </a:defRPr>
+    </a:lvl1pPr>
+    <a:lvl2pPr marL="457200" algn="l" defTabSz="914400" rtl="0" eaLnBrk="1" latinLnBrk="0" hangingPunct="1">
+      <a:defRPr sz="1200" kern="1200">
+        <a:solidFill>
+          <a:schemeClr val="tx1"/>
+        </a:solidFill>
+        <a:latin typeface="+mn-lt"/>
+        <a:ea typeface="+mn-ea"/>
+        <a:cs typeface="+mn-cs"/>
+      </a:defRPr>
+    </a:lvl2pPr>
+    <a:lvl3pPr marL="914400" algn="l" defTabSz="914400" rtl="0" eaLnBrk="1" latinLnBrk="0" hangingPunct="1">
+      <a:defRPr sz="1200" kern="1200">
+        <a:solidFill>
+          <a:schemeClr val="tx1"/>
+        </a:solidFill>
+        <a:latin typeface="+mn-lt"/>
+        <a:ea typeface="+mn-ea"/>
+        <a:cs typeface="+mn-cs"/>
+      </a:defRPr>
+    </a:lvl3pPr>
+    <a:lvl4pPr marL="1371600" algn="l" defTabSz="914400" rtl="0" eaLnBrk="1" latinLnBrk="0" hangingPunct="1">
+      <a:defRPr sz="1200" kern="1200">
+        <a:solidFill>
+          <a:schemeClr val="tx1"/>
+        </a:solidFill>
+        <a:latin typeface="+mn-lt"/>
+        <a:ea typeface="+mn-ea"/>
+        <a:cs typeface="+mn-cs"/>
+      </a:defRPr>
+    </a:lvl4pPr>
+    <a:lvl5pPr marL="1828800" algn="l" defTabSz="914400" rtl="0" eaLnBrk="1" latinLnBrk="0" hangingPunct="1">
+      <a:defRPr sz="1200" kern="1200">
+        <a:solidFill>
+          <a:schemeClr val="tx1"/>
+        </a:solidFill>
+        <a:latin typeface="+mn-lt"/>
+        <a:ea typeface="+mn-ea"/>
+        <a:cs typeface="+mn-cs"/>
+      </a:defRPr>
+    </a:lvl5pPr>
+    <a:lvl6pPr marL="2286000" algn="l" defTabSz="914400" rtl="0" eaLnBrk="1" latinLnBrk="0" hangingPunct="1">
+      <a:defRPr sz="1200" kern="1200">
+        <a:solidFill>
+          <a:schemeClr val="tx1"/>
+        </a:solidFill>
+        <a:latin typeface="+mn-lt"/>
+        <a:ea typeface="+mn-ea"/>
+        <a:cs typeface="+mn-cs"/>
+      </a:defRPr>
+    </a:lvl6pPr>
+    <a:lvl7pPr marL="2743200" algn="l" defTabSz="914400" rtl="0" eaLnBrk="1" latinLnBrk="0" hangingPunct="1">
+      <a:defRPr sz="1200" kern="1200">
+        <a:solidFill>
+          <a:schemeClr val="tx1"/>
+        </a:solidFill>
+        <a:latin typeface="+mn-lt"/>
+        <a:ea typeface="+mn-ea"/>
+        <a:cs typeface="+mn-cs"/>
+      </a:defRPr>
+    </a:lvl7pPr>
+    <a:lvl8pPr marL="3200400" algn="l" defTabSz="914400" rtl="0" eaLnBrk="1" latinLnBrk="0" hangingPunct="1">
+      <a:defRPr sz="1200" kern="1200">
+        <a:solidFill>
+          <a:schemeClr val="tx1"/>
+        </a:solidFill>
+        <a:latin typeface="+mn-lt"/>
+        <a:ea typeface="+mn-ea"/>
+        <a:cs typeface="+mn-cs"/>
+      </a:defRPr>
+    </a:lvl8pPr>
+    <a:lvl9pPr marL="3657600" algn="l" defTabSz="914400" rtl="0" eaLnBrk="1" latinLnBrk="0" hangingPunct="1">
+      <a:defRPr sz="1200" kern="1200">
+        <a:solidFill>
+          <a:schemeClr val="tx1"/>
+        </a:solidFill>
+        <a:latin typeface="+mn-lt"/>
+        <a:ea typeface="+mn-ea"/>
+        <a:cs typeface="+mn-cs"/>
+      </a:defRPr>
+    </a:lvl9pPr>
+  </p:notesStyle>
+</p:notesMaster>
+</file>
+
+<file path=ppt/notesSlides/notesSlide1.xml><?xml version="1.0" encoding="utf-8"?>
+<p:notes xmlns:a="http://schemas.openxmlformats.org/drawingml/2006/main" xmlns:r="http://schemas.openxmlformats.org/officeDocument/2006/relationships" xmlns:p="http://schemas.openxmlformats.org/presentationml/2006/main">
+  <p:cSld>
+    <p:spTree>
+      <p:nvGrpSpPr>
+        <p:cNvPr id="1" name=""/>
+        <p:cNvGrpSpPr/>
+        <p:nvPr/>
+      </p:nvGrpSpPr>
+      <p:grpSpPr>
+        <a:xfrm>
+          <a:off x="0" y="0"/>
+          <a:ext cx="0" cy="0"/>
+          <a:chOff x="0" y="0"/>
+          <a:chExt cx="0" cy="0"/>
+        </a:xfrm>
+      </p:grpSpPr>
+      <p:sp>
+        <p:nvSpPr>
+          <p:cNvPr id="2" name="Folienbildplatzhalter 1"/>
+          <p:cNvSpPr>
+            <a:spLocks noGrp="1" noRot="1" noChangeAspect="1"/>
+          </p:cNvSpPr>
+          <p:nvPr>
+            <p:ph type="sldImg"/>
+          </p:nvPr>
+        </p:nvSpPr>
+        <p:spPr/>
+      </p:sp>
+      <p:sp>
+        <p:nvSpPr>
+          <p:cNvPr id="3" name="Notizenplatzhalter 2"/>
+          <p:cNvSpPr>
+            <a:spLocks noGrp="1"/>
+          </p:cNvSpPr>
+          <p:nvPr>
+            <p:ph type="body" idx="1"/>
+          </p:nvPr>
+        </p:nvSpPr>
+        <p:spPr/>
+        <p:txBody>
+          <a:bodyPr/>
+          <a:lstStyle/>
+          <a:p>
+            <a:endParaRPr lang="de-CH" dirty="0"/>
+          </a:p>
+        </p:txBody>
+      </p:sp>
+      <p:sp>
+        <p:nvSpPr>
+          <p:cNvPr id="4" name="Foliennummernplatzhalter 3"/>
+          <p:cNvSpPr>
+            <a:spLocks noGrp="1"/>
+          </p:cNvSpPr>
+          <p:nvPr>
+            <p:ph type="sldNum" sz="quarter" idx="5"/>
+          </p:nvPr>
+        </p:nvSpPr>
+        <p:spPr/>
+        <p:txBody>
+          <a:bodyPr/>
+          <a:lstStyle/>
+          <a:p>
+            <a:fld id="{D157F58D-6983-4C8C-A011-E2CD251AFCB8}" type="slidenum">
+              <a:rPr lang="de-CH" smtClean="0"/>
+              <a:t>2</a:t>
+            </a:fld>
+            <a:endParaRPr lang="de-CH"/>
+          </a:p>
+        </p:txBody>
+      </p:sp>
+    </p:spTree>
+    <p:extLst>
+      <p:ext uri="{BB962C8B-B14F-4D97-AF65-F5344CB8AC3E}">
+        <p14:creationId xmlns:p14="http://schemas.microsoft.com/office/powerpoint/2010/main" val="4225926734"/>
+      </p:ext>
+    </p:extLst>
+  </p:cSld>
+  <p:clrMapOvr>
+    <a:masterClrMapping/>
+  </p:clrMapOvr>
+</p:notes>
 </file>
 
 <file path=ppt/slideLayouts/slideLayout1.xml><?xml version="1.0" encoding="utf-8"?>
@@ -256,7 +702,7 @@
           <a:p>
             <a:fld id="{D9A37856-7640-4F3F-B497-5DAC4141BFB1}" type="datetimeFigureOut">
               <a:rPr lang="de-CH" smtClean="0"/>
-              <a:t>11.01.2020</a:t>
+              <a:t>12.01.2020</a:t>
             </a:fld>
             <a:endParaRPr lang="de-CH"/>
           </a:p>
@@ -456,7 +902,7 @@
           <a:p>
             <a:fld id="{D9A37856-7640-4F3F-B497-5DAC4141BFB1}" type="datetimeFigureOut">
               <a:rPr lang="de-CH" smtClean="0"/>
-              <a:t>11.01.2020</a:t>
+              <a:t>12.01.2020</a:t>
             </a:fld>
             <a:endParaRPr lang="de-CH"/>
           </a:p>
@@ -666,7 +1112,7 @@
           <a:p>
             <a:fld id="{D9A37856-7640-4F3F-B497-5DAC4141BFB1}" type="datetimeFigureOut">
               <a:rPr lang="de-CH" smtClean="0"/>
-              <a:t>11.01.2020</a:t>
+              <a:t>12.01.2020</a:t>
             </a:fld>
             <a:endParaRPr lang="de-CH"/>
           </a:p>
@@ -866,7 +1312,7 @@
           <a:p>
             <a:fld id="{D9A37856-7640-4F3F-B497-5DAC4141BFB1}" type="datetimeFigureOut">
               <a:rPr lang="de-CH" smtClean="0"/>
-              <a:t>11.01.2020</a:t>
+              <a:t>12.01.2020</a:t>
             </a:fld>
             <a:endParaRPr lang="de-CH"/>
           </a:p>
@@ -1142,7 +1588,7 @@
           <a:p>
             <a:fld id="{D9A37856-7640-4F3F-B497-5DAC4141BFB1}" type="datetimeFigureOut">
               <a:rPr lang="de-CH" smtClean="0"/>
-              <a:t>11.01.2020</a:t>
+              <a:t>12.01.2020</a:t>
             </a:fld>
             <a:endParaRPr lang="de-CH"/>
           </a:p>
@@ -1410,7 +1856,7 @@
           <a:p>
             <a:fld id="{D9A37856-7640-4F3F-B497-5DAC4141BFB1}" type="datetimeFigureOut">
               <a:rPr lang="de-CH" smtClean="0"/>
-              <a:t>11.01.2020</a:t>
+              <a:t>12.01.2020</a:t>
             </a:fld>
             <a:endParaRPr lang="de-CH"/>
           </a:p>
@@ -1825,7 +2271,7 @@
           <a:p>
             <a:fld id="{D9A37856-7640-4F3F-B497-5DAC4141BFB1}" type="datetimeFigureOut">
               <a:rPr lang="de-CH" smtClean="0"/>
-              <a:t>11.01.2020</a:t>
+              <a:t>12.01.2020</a:t>
             </a:fld>
             <a:endParaRPr lang="de-CH"/>
           </a:p>
@@ -1967,7 +2413,7 @@
           <a:p>
             <a:fld id="{D9A37856-7640-4F3F-B497-5DAC4141BFB1}" type="datetimeFigureOut">
               <a:rPr lang="de-CH" smtClean="0"/>
-              <a:t>11.01.2020</a:t>
+              <a:t>12.01.2020</a:t>
             </a:fld>
             <a:endParaRPr lang="de-CH"/>
           </a:p>
@@ -2080,7 +2526,7 @@
           <a:p>
             <a:fld id="{D9A37856-7640-4F3F-B497-5DAC4141BFB1}" type="datetimeFigureOut">
               <a:rPr lang="de-CH" smtClean="0"/>
-              <a:t>11.01.2020</a:t>
+              <a:t>12.01.2020</a:t>
             </a:fld>
             <a:endParaRPr lang="de-CH"/>
           </a:p>
@@ -2393,7 +2839,7 @@
           <a:p>
             <a:fld id="{D9A37856-7640-4F3F-B497-5DAC4141BFB1}" type="datetimeFigureOut">
               <a:rPr lang="de-CH" smtClean="0"/>
-              <a:t>11.01.2020</a:t>
+              <a:t>12.01.2020</a:t>
             </a:fld>
             <a:endParaRPr lang="de-CH"/>
           </a:p>
@@ -2682,7 +3128,7 @@
           <a:p>
             <a:fld id="{D9A37856-7640-4F3F-B497-5DAC4141BFB1}" type="datetimeFigureOut">
               <a:rPr lang="de-CH" smtClean="0"/>
-              <a:t>11.01.2020</a:t>
+              <a:t>12.01.2020</a:t>
             </a:fld>
             <a:endParaRPr lang="de-CH"/>
           </a:p>
@@ -2759,9 +3205,12 @@
 <p:sldMaster xmlns:a="http://schemas.openxmlformats.org/drawingml/2006/main" xmlns:r="http://schemas.openxmlformats.org/officeDocument/2006/relationships" xmlns:p="http://schemas.openxmlformats.org/presentationml/2006/main">
   <p:cSld>
     <p:bg>
-      <p:bgRef idx="1001">
-        <a:schemeClr val="bg1"/>
-      </p:bgRef>
+      <p:bgPr>
+        <a:solidFill>
+          <a:schemeClr val="bg1"/>
+        </a:solidFill>
+        <a:effectLst/>
+      </p:bgPr>
     </p:bg>
     <p:spTree>
       <p:nvGrpSpPr>
@@ -2925,7 +3374,7 @@
           <a:p>
             <a:fld id="{D9A37856-7640-4F3F-B497-5DAC4141BFB1}" type="datetimeFigureOut">
               <a:rPr lang="de-CH" smtClean="0"/>
-              <a:t>11.01.2020</a:t>
+              <a:t>12.01.2020</a:t>
             </a:fld>
             <a:endParaRPr lang="de-CH"/>
           </a:p>
@@ -3344,6 +3793,115 @@
       </p:grpSpPr>
       <p:sp>
         <p:nvSpPr>
+          <p:cNvPr id="18" name="Rectangle 9">
+            <a:extLst>
+              <a:ext uri="{FF2B5EF4-FFF2-40B4-BE49-F238E27FC236}">
+                <a16:creationId xmlns:a16="http://schemas.microsoft.com/office/drawing/2014/main" id="{E20EB187-900F-4AF5-813B-101456D9FD39}"/>
+              </a:ext>
+              <a:ext uri="{C183D7F6-B498-43B3-948B-1728B52AA6E4}">
+                <adec:decorative xmlns:adec="http://schemas.microsoft.com/office/drawing/2017/decorative" val="1"/>
+              </a:ext>
+            </a:extLst>
+          </p:cNvPr>
+          <p:cNvSpPr>
+            <a:spLocks noGrp="1" noRot="1" noChangeAspect="1" noMove="1" noResize="1" noEditPoints="1" noAdjustHandles="1" noChangeArrowheads="1" noChangeShapeType="1" noTextEdit="1"/>
+          </p:cNvSpPr>
+          <p:nvPr>
+            <p:extLst>
+              <p:ext uri="{386F3935-93C4-4BCD-93E2-E3B085C9AB24}">
+                <p16:designElem xmlns:p16="http://schemas.microsoft.com/office/powerpoint/2015/main" val="1"/>
+              </p:ext>
+            </p:extLst>
+          </p:nvPr>
+        </p:nvSpPr>
+        <p:spPr>
+          <a:xfrm>
+            <a:off x="0" y="0"/>
+            <a:ext cx="12192000" cy="6858000"/>
+          </a:xfrm>
+          <a:prstGeom prst="rect">
+            <a:avLst/>
+          </a:prstGeom>
+          <a:solidFill>
+            <a:srgbClr val="000000"/>
+          </a:solidFill>
+          <a:ln>
+            <a:noFill/>
+          </a:ln>
+        </p:spPr>
+        <p:style>
+          <a:lnRef idx="2">
+            <a:schemeClr val="accent1">
+              <a:shade val="50000"/>
+            </a:schemeClr>
+          </a:lnRef>
+          <a:fillRef idx="1">
+            <a:schemeClr val="accent1"/>
+          </a:fillRef>
+          <a:effectRef idx="0">
+            <a:schemeClr val="accent1"/>
+          </a:effectRef>
+          <a:fontRef idx="minor">
+            <a:schemeClr val="lt1"/>
+          </a:fontRef>
+        </p:style>
+        <p:txBody>
+          <a:bodyPr rtlCol="0" anchor="ctr"/>
+          <a:lstStyle/>
+          <a:p>
+            <a:pPr algn="ctr"/>
+            <a:endParaRPr lang="en-US"/>
+          </a:p>
+        </p:txBody>
+      </p:sp>
+      <p:pic>
+        <p:nvPicPr>
+          <p:cNvPr id="5" name="Picture 2" descr="Bild könnte enthalten: Pflanze, im Freien und Natur">
+            <a:extLst>
+              <a:ext uri="{FF2B5EF4-FFF2-40B4-BE49-F238E27FC236}">
+                <a16:creationId xmlns:a16="http://schemas.microsoft.com/office/drawing/2014/main" id="{A4965D35-48D2-4632-AEFE-88923E33C527}"/>
+              </a:ext>
+            </a:extLst>
+          </p:cNvPr>
+          <p:cNvPicPr>
+            <a:picLocks noChangeAspect="1" noChangeArrowheads="1"/>
+          </p:cNvPicPr>
+          <p:nvPr/>
+        </p:nvPicPr>
+        <p:blipFill rotWithShape="1">
+          <a:blip r:embed="rId2">
+            <a:alphaModFix amt="50000"/>
+            <a:extLst>
+              <a:ext uri="{28A0092B-C50C-407E-A947-70E740481C1C}">
+                <a14:useLocalDpi xmlns:a14="http://schemas.microsoft.com/office/drawing/2010/main" val="0"/>
+              </a:ext>
+            </a:extLst>
+          </a:blip>
+          <a:srcRect/>
+          <a:stretch/>
+        </p:blipFill>
+        <p:spPr bwMode="auto">
+          <a:xfrm>
+            <a:off x="0" y="0"/>
+            <a:ext cx="12192000" cy="6858000"/>
+          </a:xfrm>
+          <a:prstGeom prst="rect">
+            <a:avLst/>
+          </a:prstGeom>
+          <a:noFill/>
+          <a:extLst>
+            <a:ext uri="{909E8E84-426E-40DD-AFC4-6F175D3DCCD1}">
+              <a14:hiddenFill xmlns:a14="http://schemas.microsoft.com/office/drawing/2010/main">
+                <a:solidFill>
+                  <a:srgbClr val="FFFFFF"/>
+                </a:solidFill>
+              </a14:hiddenFill>
+            </a:ext>
+          </a:extLst>
+        </p:spPr>
+      </p:pic>
+      <p:sp>
+        <p:nvSpPr>
           <p:cNvPr id="2" name="Titel 1">
             <a:extLst>
               <a:ext uri="{FF2B5EF4-FFF2-40B4-BE49-F238E27FC236}">
@@ -3358,16 +3916,55 @@
             <p:ph type="ctrTitle"/>
           </p:nvPr>
         </p:nvSpPr>
-        <p:spPr/>
-        <p:txBody>
-          <a:bodyPr/>
-          <a:lstStyle/>
-          <a:p>
-            <a:r>
-              <a:rPr lang="de-CH" dirty="0" err="1"/>
+        <p:spPr>
+          <a:xfrm>
+            <a:off x="4387349" y="1200152"/>
+            <a:ext cx="6897171" cy="4457696"/>
+          </a:xfrm>
+        </p:spPr>
+        <p:txBody>
+          <a:bodyPr anchor="ctr">
+            <a:normAutofit/>
+          </a:bodyPr>
+          <a:lstStyle/>
+          <a:p>
+            <a:pPr algn="l"/>
+            <a:r>
+              <a:rPr lang="de-CH" sz="8000" dirty="0" err="1">
+                <a:solidFill>
+                  <a:srgbClr val="FFFFFF"/>
+                </a:solidFill>
+              </a:rPr>
+              <a:t>IoT</a:t>
+            </a:r>
+            <a:r>
+              <a:rPr lang="de-CH" sz="8000" dirty="0">
+                <a:solidFill>
+                  <a:srgbClr val="FFFFFF"/>
+                </a:solidFill>
+              </a:rPr>
+              <a:t> Engineering</a:t>
+            </a:r>
+            <a:br>
+              <a:rPr lang="de-CH" sz="8000" dirty="0">
+                <a:solidFill>
+                  <a:srgbClr val="FFFFFF"/>
+                </a:solidFill>
+              </a:rPr>
+            </a:br>
+            <a:r>
+              <a:rPr lang="de-CH" sz="8000" dirty="0" err="1">
+                <a:solidFill>
+                  <a:srgbClr val="FFFFFF"/>
+                </a:solidFill>
+              </a:rPr>
               <a:t>RaspberryReef</a:t>
             </a:r>
-            <a:endParaRPr lang="de-CH" dirty="0"/>
+            <a:endParaRPr lang="de-CH" sz="8000" dirty="0">
+              <a:solidFill>
+                <a:srgbClr val="FFFFFF"/>
+              </a:solidFill>
+            </a:endParaRPr>
           </a:p>
         </p:txBody>
       </p:sp>
@@ -3387,38 +3984,2324 @@
             <p:ph type="subTitle" idx="1"/>
           </p:nvPr>
         </p:nvSpPr>
-        <p:spPr/>
-        <p:txBody>
-          <a:bodyPr/>
-          <a:lstStyle/>
-          <a:p>
-            <a:r>
-              <a:rPr lang="de-CH" dirty="0"/>
-              <a:t>FHNW-</a:t>
-            </a:r>
-            <a:r>
-              <a:rPr lang="de-CH" dirty="0" err="1"/>
-              <a:t>IoT</a:t>
-            </a:r>
-            <a:r>
-              <a:rPr lang="de-CH" dirty="0"/>
-              <a:t> Project </a:t>
-            </a:r>
-            <a:r>
-              <a:rPr lang="de-CH" dirty="0" err="1"/>
-              <a:t>by</a:t>
-            </a:r>
-            <a:r>
-              <a:rPr lang="de-CH" dirty="0"/>
-              <a:t> Jonathan James Bättig</a:t>
-            </a:r>
-          </a:p>
-        </p:txBody>
-      </p:sp>
+        <p:spPr>
+          <a:xfrm>
+            <a:off x="849963" y="1200152"/>
+            <a:ext cx="2816535" cy="4457696"/>
+          </a:xfrm>
+        </p:spPr>
+        <p:txBody>
+          <a:bodyPr anchor="ctr">
+            <a:normAutofit/>
+          </a:bodyPr>
+          <a:lstStyle/>
+          <a:p>
+            <a:pPr algn="r"/>
+            <a:r>
+              <a:rPr lang="de-CH" sz="2800">
+                <a:solidFill>
+                  <a:srgbClr val="FFFFFF"/>
+                </a:solidFill>
+              </a:rPr>
+              <a:t>FHNW-IoT Project by Jonathan James Bättig</a:t>
+            </a:r>
+          </a:p>
+        </p:txBody>
+      </p:sp>
+      <p:cxnSp>
+        <p:nvCxnSpPr>
+          <p:cNvPr id="19" name="Straight Connector 11">
+            <a:extLst>
+              <a:ext uri="{FF2B5EF4-FFF2-40B4-BE49-F238E27FC236}">
+                <a16:creationId xmlns:a16="http://schemas.microsoft.com/office/drawing/2014/main" id="{624D17C8-E9C2-48A4-AA36-D7048A6CCC41}"/>
+              </a:ext>
+              <a:ext uri="{C183D7F6-B498-43B3-948B-1728B52AA6E4}">
+                <adec:decorative xmlns:adec="http://schemas.microsoft.com/office/drawing/2017/decorative" val="1"/>
+              </a:ext>
+            </a:extLst>
+          </p:cNvPr>
+          <p:cNvCxnSpPr>
+            <a:cxnSpLocks noGrp="1" noRot="1" noChangeAspect="1" noMove="1" noResize="1" noEditPoints="1" noAdjustHandles="1" noChangeArrowheads="1" noChangeShapeType="1"/>
+          </p:cNvCxnSpPr>
+          <p:nvPr>
+            <p:extLst>
+              <p:ext uri="{386F3935-93C4-4BCD-93E2-E3B085C9AB24}">
+                <p16:designElem xmlns:p16="http://schemas.microsoft.com/office/powerpoint/2015/main" val="1"/>
+              </p:ext>
+            </p:extLst>
+          </p:nvPr>
+        </p:nvCxnSpPr>
+        <p:spPr>
+          <a:xfrm>
+            <a:off x="4055891" y="2286000"/>
+            <a:ext cx="0" cy="2286000"/>
+          </a:xfrm>
+          <a:prstGeom prst="line">
+            <a:avLst/>
+          </a:prstGeom>
+          <a:ln w="19050">
+            <a:solidFill>
+              <a:srgbClr val="FFFFFF"/>
+            </a:solidFill>
+          </a:ln>
+        </p:spPr>
+        <p:style>
+          <a:lnRef idx="1">
+            <a:schemeClr val="accent1"/>
+          </a:lnRef>
+          <a:fillRef idx="0">
+            <a:schemeClr val="accent1"/>
+          </a:fillRef>
+          <a:effectRef idx="0">
+            <a:schemeClr val="accent1"/>
+          </a:effectRef>
+          <a:fontRef idx="minor">
+            <a:schemeClr val="tx1"/>
+          </a:fontRef>
+        </p:style>
+      </p:cxnSp>
     </p:spTree>
     <p:extLst>
       <p:ext uri="{BB962C8B-B14F-4D97-AF65-F5344CB8AC3E}">
         <p14:creationId xmlns:p14="http://schemas.microsoft.com/office/powerpoint/2010/main" val="1512448469"/>
+      </p:ext>
+    </p:extLst>
+  </p:cSld>
+  <p:clrMapOvr>
+    <a:overrideClrMapping bg1="dk1" tx1="lt1" bg2="dk2" tx2="lt2" accent1="accent1" accent2="accent2" accent3="accent3" accent4="accent4" accent5="accent5" accent6="accent6" hlink="hlink" folHlink="folHlink"/>
+  </p:clrMapOvr>
+</p:sld>
+</file>
+
+<file path=ppt/slides/slide2.xml><?xml version="1.0" encoding="utf-8"?>
+<p:sld xmlns:a="http://schemas.openxmlformats.org/drawingml/2006/main" xmlns:r="http://schemas.openxmlformats.org/officeDocument/2006/relationships" xmlns:p="http://schemas.openxmlformats.org/presentationml/2006/main">
+  <p:cSld>
+    <p:spTree>
+      <p:nvGrpSpPr>
+        <p:cNvPr id="1" name=""/>
+        <p:cNvGrpSpPr/>
+        <p:nvPr/>
+      </p:nvGrpSpPr>
+      <p:grpSpPr>
+        <a:xfrm>
+          <a:off x="0" y="0"/>
+          <a:ext cx="0" cy="0"/>
+          <a:chOff x="0" y="0"/>
+          <a:chExt cx="0" cy="0"/>
+        </a:xfrm>
+      </p:grpSpPr>
+      <p:pic>
+        <p:nvPicPr>
+          <p:cNvPr id="9" name="Grafik 8">
+            <a:extLst>
+              <a:ext uri="{FF2B5EF4-FFF2-40B4-BE49-F238E27FC236}">
+                <a16:creationId xmlns:a16="http://schemas.microsoft.com/office/drawing/2014/main" id="{F2FF8F91-F686-4DAF-B993-D3AE2950656D}"/>
+              </a:ext>
+            </a:extLst>
+          </p:cNvPr>
+          <p:cNvPicPr>
+            <a:picLocks noChangeAspect="1"/>
+          </p:cNvPicPr>
+          <p:nvPr/>
+        </p:nvPicPr>
+        <p:blipFill>
+          <a:blip r:embed="rId3"/>
+          <a:stretch>
+            <a:fillRect/>
+          </a:stretch>
+        </p:blipFill>
+        <p:spPr>
+          <a:xfrm>
+            <a:off x="230309" y="1477553"/>
+            <a:ext cx="2238375" cy="2276475"/>
+          </a:xfrm>
+          <a:prstGeom prst="rect">
+            <a:avLst/>
+          </a:prstGeom>
+        </p:spPr>
+      </p:pic>
+      <p:cxnSp>
+        <p:nvCxnSpPr>
+          <p:cNvPr id="75" name="Gerader Verbinder 74">
+            <a:extLst>
+              <a:ext uri="{FF2B5EF4-FFF2-40B4-BE49-F238E27FC236}">
+                <a16:creationId xmlns:a16="http://schemas.microsoft.com/office/drawing/2014/main" id="{DB0E8D5C-6A74-4AC1-924B-5502838B52C7}"/>
+              </a:ext>
+            </a:extLst>
+          </p:cNvPr>
+          <p:cNvCxnSpPr>
+            <a:cxnSpLocks/>
+          </p:cNvCxnSpPr>
+          <p:nvPr/>
+        </p:nvCxnSpPr>
+        <p:spPr>
+          <a:xfrm flipH="1" flipV="1">
+            <a:off x="2061177" y="3426350"/>
+            <a:ext cx="2421824" cy="2796003"/>
+          </a:xfrm>
+          <a:prstGeom prst="line">
+            <a:avLst/>
+          </a:prstGeom>
+          <a:ln w="38100" cap="flat" cmpd="sng" algn="ctr">
+            <a:solidFill>
+              <a:srgbClr val="00B0F0"/>
+            </a:solidFill>
+            <a:prstDash val="dash"/>
+            <a:round/>
+            <a:headEnd type="none" w="med" len="med"/>
+            <a:tailEnd type="none" w="med" len="med"/>
+          </a:ln>
+        </p:spPr>
+        <p:style>
+          <a:lnRef idx="0">
+            <a:scrgbClr r="0" g="0" b="0"/>
+          </a:lnRef>
+          <a:fillRef idx="0">
+            <a:scrgbClr r="0" g="0" b="0"/>
+          </a:fillRef>
+          <a:effectRef idx="0">
+            <a:scrgbClr r="0" g="0" b="0"/>
+          </a:effectRef>
+          <a:fontRef idx="minor">
+            <a:schemeClr val="tx1"/>
+          </a:fontRef>
+        </p:style>
+      </p:cxnSp>
+      <p:sp>
+        <p:nvSpPr>
+          <p:cNvPr id="71" name="Rechteck: abgerundete Ecken 70">
+            <a:extLst>
+              <a:ext uri="{FF2B5EF4-FFF2-40B4-BE49-F238E27FC236}">
+                <a16:creationId xmlns:a16="http://schemas.microsoft.com/office/drawing/2014/main" id="{C19A5FA7-1B8C-480D-840C-17CD17D66A64}"/>
+              </a:ext>
+            </a:extLst>
+          </p:cNvPr>
+          <p:cNvSpPr/>
+          <p:nvPr/>
+        </p:nvSpPr>
+        <p:spPr>
+          <a:xfrm>
+            <a:off x="102475" y="3847448"/>
+            <a:ext cx="2711421" cy="1504949"/>
+          </a:xfrm>
+          <a:prstGeom prst="roundRect">
+            <a:avLst/>
+          </a:prstGeom>
+          <a:solidFill>
+            <a:schemeClr val="bg1"/>
+          </a:solidFill>
+          <a:ln>
+            <a:solidFill>
+              <a:schemeClr val="tx1"/>
+            </a:solidFill>
+          </a:ln>
+        </p:spPr>
+        <p:style>
+          <a:lnRef idx="2">
+            <a:schemeClr val="accent1">
+              <a:shade val="50000"/>
+            </a:schemeClr>
+          </a:lnRef>
+          <a:fillRef idx="1">
+            <a:schemeClr val="accent1"/>
+          </a:fillRef>
+          <a:effectRef idx="0">
+            <a:schemeClr val="accent1"/>
+          </a:effectRef>
+          <a:fontRef idx="minor">
+            <a:schemeClr val="lt1"/>
+          </a:fontRef>
+        </p:style>
+        <p:txBody>
+          <a:bodyPr rtlCol="0" anchor="ctr"/>
+          <a:lstStyle/>
+          <a:p>
+            <a:pPr algn="ctr"/>
+            <a:endParaRPr lang="de-CH"/>
+          </a:p>
+        </p:txBody>
+      </p:sp>
+      <p:sp>
+        <p:nvSpPr>
+          <p:cNvPr id="2" name="Titel 1">
+            <a:extLst>
+              <a:ext uri="{FF2B5EF4-FFF2-40B4-BE49-F238E27FC236}">
+                <a16:creationId xmlns:a16="http://schemas.microsoft.com/office/drawing/2014/main" id="{37EC4FE7-21C1-488C-8199-16AC03FCBF51}"/>
+              </a:ext>
+            </a:extLst>
+          </p:cNvPr>
+          <p:cNvSpPr>
+            <a:spLocks noGrp="1"/>
+          </p:cNvSpPr>
+          <p:nvPr>
+            <p:ph type="title"/>
+          </p:nvPr>
+        </p:nvSpPr>
+        <p:spPr>
+          <a:xfrm>
+            <a:off x="838200" y="365125"/>
+            <a:ext cx="10515600" cy="1325563"/>
+          </a:xfrm>
+        </p:spPr>
+        <p:txBody>
+          <a:bodyPr/>
+          <a:lstStyle/>
+          <a:p>
+            <a:r>
+              <a:rPr lang="de-CH" dirty="0"/>
+              <a:t>Reference </a:t>
+            </a:r>
+            <a:r>
+              <a:rPr lang="de-CH" dirty="0" err="1"/>
+              <a:t>model</a:t>
+            </a:r>
+            <a:endParaRPr lang="de-CH" dirty="0"/>
+          </a:p>
+        </p:txBody>
+      </p:sp>
+      <p:pic>
+        <p:nvPicPr>
+          <p:cNvPr id="5" name="Grafik 4">
+            <a:extLst>
+              <a:ext uri="{FF2B5EF4-FFF2-40B4-BE49-F238E27FC236}">
+                <a16:creationId xmlns:a16="http://schemas.microsoft.com/office/drawing/2014/main" id="{C264FC82-1A59-433A-AADF-DBD5C3D4C6BB}"/>
+              </a:ext>
+            </a:extLst>
+          </p:cNvPr>
+          <p:cNvPicPr>
+            <a:picLocks noChangeAspect="1"/>
+          </p:cNvPicPr>
+          <p:nvPr/>
+        </p:nvPicPr>
+        <p:blipFill>
+          <a:blip r:embed="rId4"/>
+          <a:stretch>
+            <a:fillRect/>
+          </a:stretch>
+        </p:blipFill>
+        <p:spPr>
+          <a:xfrm>
+            <a:off x="3054251" y="2063286"/>
+            <a:ext cx="2724150" cy="1504950"/>
+          </a:xfrm>
+          <a:prstGeom prst="rect">
+            <a:avLst/>
+          </a:prstGeom>
+        </p:spPr>
+      </p:pic>
+      <p:pic>
+        <p:nvPicPr>
+          <p:cNvPr id="10" name="Grafik 9">
+            <a:extLst>
+              <a:ext uri="{FF2B5EF4-FFF2-40B4-BE49-F238E27FC236}">
+                <a16:creationId xmlns:a16="http://schemas.microsoft.com/office/drawing/2014/main" id="{61B02C5D-E95A-4989-BF9D-A956DC2E46B9}"/>
+              </a:ext>
+            </a:extLst>
+          </p:cNvPr>
+          <p:cNvPicPr>
+            <a:picLocks noChangeAspect="1"/>
+          </p:cNvPicPr>
+          <p:nvPr/>
+        </p:nvPicPr>
+        <p:blipFill>
+          <a:blip r:embed="rId5"/>
+          <a:stretch>
+            <a:fillRect/>
+          </a:stretch>
+        </p:blipFill>
+        <p:spPr>
+          <a:xfrm>
+            <a:off x="10201880" y="1029608"/>
+            <a:ext cx="1628775" cy="3057525"/>
+          </a:xfrm>
+          <a:prstGeom prst="rect">
+            <a:avLst/>
+          </a:prstGeom>
+        </p:spPr>
+      </p:pic>
+      <p:pic>
+        <p:nvPicPr>
+          <p:cNvPr id="12" name="Grafik 11">
+            <a:extLst>
+              <a:ext uri="{FF2B5EF4-FFF2-40B4-BE49-F238E27FC236}">
+                <a16:creationId xmlns:a16="http://schemas.microsoft.com/office/drawing/2014/main" id="{1FBCA911-95A6-4AC1-B59D-A4036926A0D6}"/>
+              </a:ext>
+            </a:extLst>
+          </p:cNvPr>
+          <p:cNvPicPr>
+            <a:picLocks noChangeAspect="1"/>
+          </p:cNvPicPr>
+          <p:nvPr/>
+        </p:nvPicPr>
+        <p:blipFill>
+          <a:blip r:embed="rId6"/>
+          <a:stretch>
+            <a:fillRect/>
+          </a:stretch>
+        </p:blipFill>
+        <p:spPr>
+          <a:xfrm>
+            <a:off x="4483001" y="4181474"/>
+            <a:ext cx="2590800" cy="2476500"/>
+          </a:xfrm>
+          <a:prstGeom prst="rect">
+            <a:avLst/>
+          </a:prstGeom>
+        </p:spPr>
+      </p:pic>
+      <p:pic>
+        <p:nvPicPr>
+          <p:cNvPr id="14" name="Grafik 13">
+            <a:extLst>
+              <a:ext uri="{FF2B5EF4-FFF2-40B4-BE49-F238E27FC236}">
+                <a16:creationId xmlns:a16="http://schemas.microsoft.com/office/drawing/2014/main" id="{3919B6EC-6B62-4261-8EA0-41664BCC62FB}"/>
+              </a:ext>
+            </a:extLst>
+          </p:cNvPr>
+          <p:cNvPicPr>
+            <a:picLocks noChangeAspect="1"/>
+          </p:cNvPicPr>
+          <p:nvPr/>
+        </p:nvPicPr>
+        <p:blipFill>
+          <a:blip r:embed="rId7"/>
+          <a:stretch>
+            <a:fillRect/>
+          </a:stretch>
+        </p:blipFill>
+        <p:spPr>
+          <a:xfrm>
+            <a:off x="6852428" y="959922"/>
+            <a:ext cx="2275424" cy="1504949"/>
+          </a:xfrm>
+          <a:prstGeom prst="rect">
+            <a:avLst/>
+          </a:prstGeom>
+        </p:spPr>
+      </p:pic>
+      <p:pic>
+        <p:nvPicPr>
+          <p:cNvPr id="11" name="Grafik 10">
+            <a:extLst>
+              <a:ext uri="{FF2B5EF4-FFF2-40B4-BE49-F238E27FC236}">
+                <a16:creationId xmlns:a16="http://schemas.microsoft.com/office/drawing/2014/main" id="{5F9EC5B5-FAB5-499A-B366-6E6FA665A173}"/>
+              </a:ext>
+            </a:extLst>
+          </p:cNvPr>
+          <p:cNvPicPr>
+            <a:picLocks noChangeAspect="1"/>
+          </p:cNvPicPr>
+          <p:nvPr/>
+        </p:nvPicPr>
+        <p:blipFill>
+          <a:blip r:embed="rId7"/>
+          <a:stretch>
+            <a:fillRect/>
+          </a:stretch>
+        </p:blipFill>
+        <p:spPr>
+          <a:xfrm>
+            <a:off x="6852428" y="2722472"/>
+            <a:ext cx="2275424" cy="1504949"/>
+          </a:xfrm>
+          <a:prstGeom prst="rect">
+            <a:avLst/>
+          </a:prstGeom>
+        </p:spPr>
+      </p:pic>
+      <p:sp>
+        <p:nvSpPr>
+          <p:cNvPr id="13" name="Textfeld 12">
+            <a:extLst>
+              <a:ext uri="{FF2B5EF4-FFF2-40B4-BE49-F238E27FC236}">
+                <a16:creationId xmlns:a16="http://schemas.microsoft.com/office/drawing/2014/main" id="{0B174F01-A38D-4B75-9E70-011F22B4074D}"/>
+              </a:ext>
+            </a:extLst>
+          </p:cNvPr>
+          <p:cNvSpPr txBox="1"/>
+          <p:nvPr/>
+        </p:nvSpPr>
+        <p:spPr>
+          <a:xfrm>
+            <a:off x="474134" y="2076026"/>
+            <a:ext cx="1434367" cy="646331"/>
+          </a:xfrm>
+          <a:prstGeom prst="rect">
+            <a:avLst/>
+          </a:prstGeom>
+          <a:noFill/>
+        </p:spPr>
+        <p:txBody>
+          <a:bodyPr wrap="none" rtlCol="0">
+            <a:spAutoFit/>
+          </a:bodyPr>
+          <a:lstStyle/>
+          <a:p>
+            <a:r>
+              <a:rPr lang="de-CH" sz="3600" dirty="0"/>
+              <a:t>Device</a:t>
+            </a:r>
+          </a:p>
+        </p:txBody>
+      </p:sp>
+      <p:sp>
+        <p:nvSpPr>
+          <p:cNvPr id="15" name="Rechteck 14">
+            <a:extLst>
+              <a:ext uri="{FF2B5EF4-FFF2-40B4-BE49-F238E27FC236}">
+                <a16:creationId xmlns:a16="http://schemas.microsoft.com/office/drawing/2014/main" id="{FF89AF29-FB73-4488-AEEA-A5DCA6DE506C}"/>
+              </a:ext>
+            </a:extLst>
+          </p:cNvPr>
+          <p:cNvSpPr/>
+          <p:nvPr/>
+        </p:nvSpPr>
+        <p:spPr>
+          <a:xfrm>
+            <a:off x="3481949" y="2226021"/>
+            <a:ext cx="1815305" cy="1200329"/>
+          </a:xfrm>
+          <a:prstGeom prst="rect">
+            <a:avLst/>
+          </a:prstGeom>
+        </p:spPr>
+        <p:txBody>
+          <a:bodyPr wrap="none">
+            <a:spAutoFit/>
+          </a:bodyPr>
+          <a:lstStyle/>
+          <a:p>
+            <a:pPr algn="ctr"/>
+            <a:r>
+              <a:rPr lang="de-CH" sz="3600" dirty="0">
+                <a:solidFill>
+                  <a:schemeClr val="bg1"/>
+                </a:solidFill>
+              </a:rPr>
+              <a:t>Wi-Fi</a:t>
+            </a:r>
+            <a:br>
+              <a:rPr lang="de-CH" sz="3600" dirty="0">
+                <a:solidFill>
+                  <a:schemeClr val="bg1"/>
+                </a:solidFill>
+              </a:rPr>
+            </a:br>
+            <a:r>
+              <a:rPr lang="de-CH" sz="3600" dirty="0">
+                <a:solidFill>
+                  <a:schemeClr val="bg1"/>
+                </a:solidFill>
+              </a:rPr>
+              <a:t>Gateway</a:t>
+            </a:r>
+          </a:p>
+        </p:txBody>
+      </p:sp>
+      <p:sp>
+        <p:nvSpPr>
+          <p:cNvPr id="17" name="Rechteck 16">
+            <a:extLst>
+              <a:ext uri="{FF2B5EF4-FFF2-40B4-BE49-F238E27FC236}">
+                <a16:creationId xmlns:a16="http://schemas.microsoft.com/office/drawing/2014/main" id="{0B3B6079-0727-4BED-A053-D675932BDB3A}"/>
+              </a:ext>
+            </a:extLst>
+          </p:cNvPr>
+          <p:cNvSpPr/>
+          <p:nvPr/>
+        </p:nvSpPr>
+        <p:spPr>
+          <a:xfrm>
+            <a:off x="7100667" y="1177658"/>
+            <a:ext cx="1761572" cy="1200329"/>
+          </a:xfrm>
+          <a:prstGeom prst="rect">
+            <a:avLst/>
+          </a:prstGeom>
+        </p:spPr>
+        <p:txBody>
+          <a:bodyPr wrap="none">
+            <a:spAutoFit/>
+          </a:bodyPr>
+          <a:lstStyle/>
+          <a:p>
+            <a:pPr algn="ctr"/>
+            <a:r>
+              <a:rPr lang="de-CH" sz="3600" dirty="0">
+                <a:solidFill>
+                  <a:schemeClr val="bg1"/>
+                </a:solidFill>
+              </a:rPr>
+              <a:t>Twitter</a:t>
+            </a:r>
+            <a:br>
+              <a:rPr lang="de-CH" sz="3600" dirty="0">
+                <a:solidFill>
+                  <a:schemeClr val="bg1"/>
+                </a:solidFill>
+              </a:rPr>
+            </a:br>
+            <a:r>
+              <a:rPr lang="de-CH" sz="3600" dirty="0">
+                <a:solidFill>
+                  <a:schemeClr val="bg1"/>
+                </a:solidFill>
+              </a:rPr>
+              <a:t>Backend</a:t>
+            </a:r>
+          </a:p>
+        </p:txBody>
+      </p:sp>
+      <p:sp>
+        <p:nvSpPr>
+          <p:cNvPr id="19" name="Rechteck 18">
+            <a:extLst>
+              <a:ext uri="{FF2B5EF4-FFF2-40B4-BE49-F238E27FC236}">
+                <a16:creationId xmlns:a16="http://schemas.microsoft.com/office/drawing/2014/main" id="{538C97F2-1B20-4881-9301-21D5FF43B93F}"/>
+              </a:ext>
+            </a:extLst>
+          </p:cNvPr>
+          <p:cNvSpPr/>
+          <p:nvPr/>
+        </p:nvSpPr>
+        <p:spPr>
+          <a:xfrm>
+            <a:off x="7109355" y="2968071"/>
+            <a:ext cx="1761572" cy="1200329"/>
+          </a:xfrm>
+          <a:prstGeom prst="rect">
+            <a:avLst/>
+          </a:prstGeom>
+        </p:spPr>
+        <p:txBody>
+          <a:bodyPr wrap="none">
+            <a:spAutoFit/>
+          </a:bodyPr>
+          <a:lstStyle/>
+          <a:p>
+            <a:pPr algn="ctr"/>
+            <a:r>
+              <a:rPr lang="de-CH" sz="3600" dirty="0">
+                <a:solidFill>
+                  <a:schemeClr val="bg1"/>
+                </a:solidFill>
+              </a:rPr>
+              <a:t>TS</a:t>
+            </a:r>
+            <a:br>
+              <a:rPr lang="de-CH" sz="3600" dirty="0">
+                <a:solidFill>
+                  <a:schemeClr val="bg1"/>
+                </a:solidFill>
+              </a:rPr>
+            </a:br>
+            <a:r>
+              <a:rPr lang="de-CH" sz="3600" dirty="0">
+                <a:solidFill>
+                  <a:schemeClr val="bg1"/>
+                </a:solidFill>
+              </a:rPr>
+              <a:t>Backend</a:t>
+            </a:r>
+          </a:p>
+        </p:txBody>
+      </p:sp>
+      <p:cxnSp>
+        <p:nvCxnSpPr>
+          <p:cNvPr id="22" name="Gerader Verbinder 21">
+            <a:extLst>
+              <a:ext uri="{FF2B5EF4-FFF2-40B4-BE49-F238E27FC236}">
+                <a16:creationId xmlns:a16="http://schemas.microsoft.com/office/drawing/2014/main" id="{880C085E-7855-414E-9E4D-87CB4459DDE0}"/>
+              </a:ext>
+            </a:extLst>
+          </p:cNvPr>
+          <p:cNvCxnSpPr>
+            <a:cxnSpLocks/>
+          </p:cNvCxnSpPr>
+          <p:nvPr/>
+        </p:nvCxnSpPr>
+        <p:spPr>
+          <a:xfrm>
+            <a:off x="2061176" y="2748001"/>
+            <a:ext cx="1030706" cy="0"/>
+          </a:xfrm>
+          <a:prstGeom prst="line">
+            <a:avLst/>
+          </a:prstGeom>
+          <a:ln w="38100">
+            <a:solidFill>
+              <a:srgbClr val="00B0F0"/>
+            </a:solidFill>
+          </a:ln>
+        </p:spPr>
+        <p:style>
+          <a:lnRef idx="1">
+            <a:schemeClr val="accent1"/>
+          </a:lnRef>
+          <a:fillRef idx="0">
+            <a:schemeClr val="accent1"/>
+          </a:fillRef>
+          <a:effectRef idx="0">
+            <a:schemeClr val="accent1"/>
+          </a:effectRef>
+          <a:fontRef idx="minor">
+            <a:schemeClr val="tx1"/>
+          </a:fontRef>
+        </p:style>
+      </p:cxnSp>
+      <p:cxnSp>
+        <p:nvCxnSpPr>
+          <p:cNvPr id="33" name="Gerader Verbinder 32">
+            <a:extLst>
+              <a:ext uri="{FF2B5EF4-FFF2-40B4-BE49-F238E27FC236}">
+                <a16:creationId xmlns:a16="http://schemas.microsoft.com/office/drawing/2014/main" id="{1D80B43C-FB60-48BC-B6DB-A0C68901EF2D}"/>
+              </a:ext>
+            </a:extLst>
+          </p:cNvPr>
+          <p:cNvCxnSpPr>
+            <a:cxnSpLocks/>
+          </p:cNvCxnSpPr>
+          <p:nvPr/>
+        </p:nvCxnSpPr>
+        <p:spPr>
+          <a:xfrm flipV="1">
+            <a:off x="5713413" y="2170635"/>
+            <a:ext cx="1188740" cy="275918"/>
+          </a:xfrm>
+          <a:prstGeom prst="line">
+            <a:avLst/>
+          </a:prstGeom>
+          <a:ln w="38100">
+            <a:solidFill>
+              <a:srgbClr val="00B0F0"/>
+            </a:solidFill>
+          </a:ln>
+        </p:spPr>
+        <p:style>
+          <a:lnRef idx="1">
+            <a:schemeClr val="accent1"/>
+          </a:lnRef>
+          <a:fillRef idx="0">
+            <a:schemeClr val="accent1"/>
+          </a:fillRef>
+          <a:effectRef idx="0">
+            <a:schemeClr val="accent1"/>
+          </a:effectRef>
+          <a:fontRef idx="minor">
+            <a:schemeClr val="tx1"/>
+          </a:fontRef>
+        </p:style>
+      </p:cxnSp>
+      <p:cxnSp>
+        <p:nvCxnSpPr>
+          <p:cNvPr id="38" name="Gerader Verbinder 37">
+            <a:extLst>
+              <a:ext uri="{FF2B5EF4-FFF2-40B4-BE49-F238E27FC236}">
+                <a16:creationId xmlns:a16="http://schemas.microsoft.com/office/drawing/2014/main" id="{3B6010EF-CE1B-4D54-8960-16D14D9B60BB}"/>
+              </a:ext>
+            </a:extLst>
+          </p:cNvPr>
+          <p:cNvCxnSpPr>
+            <a:cxnSpLocks/>
+          </p:cNvCxnSpPr>
+          <p:nvPr/>
+        </p:nvCxnSpPr>
+        <p:spPr>
+          <a:xfrm flipH="1" flipV="1">
+            <a:off x="5713413" y="3238048"/>
+            <a:ext cx="1216305" cy="330187"/>
+          </a:xfrm>
+          <a:prstGeom prst="line">
+            <a:avLst/>
+          </a:prstGeom>
+          <a:ln w="38100">
+            <a:solidFill>
+              <a:srgbClr val="00B0F0"/>
+            </a:solidFill>
+          </a:ln>
+        </p:spPr>
+        <p:style>
+          <a:lnRef idx="1">
+            <a:schemeClr val="accent1"/>
+          </a:lnRef>
+          <a:fillRef idx="0">
+            <a:schemeClr val="accent1"/>
+          </a:fillRef>
+          <a:effectRef idx="0">
+            <a:schemeClr val="accent1"/>
+          </a:effectRef>
+          <a:fontRef idx="minor">
+            <a:schemeClr val="tx1"/>
+          </a:fontRef>
+        </p:style>
+      </p:cxnSp>
+      <p:cxnSp>
+        <p:nvCxnSpPr>
+          <p:cNvPr id="41" name="Gerader Verbinder 40">
+            <a:extLst>
+              <a:ext uri="{FF2B5EF4-FFF2-40B4-BE49-F238E27FC236}">
+                <a16:creationId xmlns:a16="http://schemas.microsoft.com/office/drawing/2014/main" id="{2D4D08E9-D4E2-4B66-AF89-6886299E8E1C}"/>
+              </a:ext>
+            </a:extLst>
+          </p:cNvPr>
+          <p:cNvCxnSpPr>
+            <a:cxnSpLocks/>
+          </p:cNvCxnSpPr>
+          <p:nvPr/>
+        </p:nvCxnSpPr>
+        <p:spPr>
+          <a:xfrm>
+            <a:off x="9060753" y="2170635"/>
+            <a:ext cx="1206114" cy="275918"/>
+          </a:xfrm>
+          <a:prstGeom prst="line">
+            <a:avLst/>
+          </a:prstGeom>
+          <a:ln w="38100">
+            <a:solidFill>
+              <a:srgbClr val="00B0F0"/>
+            </a:solidFill>
+          </a:ln>
+        </p:spPr>
+        <p:style>
+          <a:lnRef idx="1">
+            <a:schemeClr val="accent1"/>
+          </a:lnRef>
+          <a:fillRef idx="0">
+            <a:schemeClr val="accent1"/>
+          </a:fillRef>
+          <a:effectRef idx="0">
+            <a:schemeClr val="accent1"/>
+          </a:effectRef>
+          <a:fontRef idx="minor">
+            <a:schemeClr val="tx1"/>
+          </a:fontRef>
+        </p:style>
+      </p:cxnSp>
+      <p:cxnSp>
+        <p:nvCxnSpPr>
+          <p:cNvPr id="44" name="Gerader Verbinder 43">
+            <a:extLst>
+              <a:ext uri="{FF2B5EF4-FFF2-40B4-BE49-F238E27FC236}">
+                <a16:creationId xmlns:a16="http://schemas.microsoft.com/office/drawing/2014/main" id="{5C013C6B-3373-4259-8680-055D59D4ECAB}"/>
+              </a:ext>
+            </a:extLst>
+          </p:cNvPr>
+          <p:cNvCxnSpPr>
+            <a:cxnSpLocks/>
+          </p:cNvCxnSpPr>
+          <p:nvPr/>
+        </p:nvCxnSpPr>
+        <p:spPr>
+          <a:xfrm flipV="1">
+            <a:off x="9050564" y="2944818"/>
+            <a:ext cx="1216303" cy="672891"/>
+          </a:xfrm>
+          <a:prstGeom prst="line">
+            <a:avLst/>
+          </a:prstGeom>
+          <a:ln w="38100">
+            <a:solidFill>
+              <a:srgbClr val="00B0F0"/>
+            </a:solidFill>
+          </a:ln>
+        </p:spPr>
+        <p:style>
+          <a:lnRef idx="1">
+            <a:schemeClr val="accent1"/>
+          </a:lnRef>
+          <a:fillRef idx="0">
+            <a:schemeClr val="accent1"/>
+          </a:fillRef>
+          <a:effectRef idx="0">
+            <a:schemeClr val="accent1"/>
+          </a:effectRef>
+          <a:fontRef idx="minor">
+            <a:schemeClr val="tx1"/>
+          </a:fontRef>
+        </p:style>
+      </p:cxnSp>
+      <p:sp>
+        <p:nvSpPr>
+          <p:cNvPr id="48" name="Textfeld 47">
+            <a:extLst>
+              <a:ext uri="{FF2B5EF4-FFF2-40B4-BE49-F238E27FC236}">
+                <a16:creationId xmlns:a16="http://schemas.microsoft.com/office/drawing/2014/main" id="{3312AD26-D515-42A8-873B-C2606272C6E2}"/>
+              </a:ext>
+            </a:extLst>
+          </p:cNvPr>
+          <p:cNvSpPr txBox="1"/>
+          <p:nvPr/>
+        </p:nvSpPr>
+        <p:spPr>
+          <a:xfrm>
+            <a:off x="2212864" y="2431124"/>
+            <a:ext cx="671979" cy="369332"/>
+          </a:xfrm>
+          <a:prstGeom prst="rect">
+            <a:avLst/>
+          </a:prstGeom>
+          <a:noFill/>
+        </p:spPr>
+        <p:txBody>
+          <a:bodyPr wrap="none" rtlCol="0">
+            <a:spAutoFit/>
+          </a:bodyPr>
+          <a:lstStyle/>
+          <a:p>
+            <a:r>
+              <a:rPr lang="de-CH" dirty="0"/>
+              <a:t>Wi-Fi</a:t>
+            </a:r>
+          </a:p>
+        </p:txBody>
+      </p:sp>
+      <p:sp>
+        <p:nvSpPr>
+          <p:cNvPr id="49" name="Textfeld 48">
+            <a:extLst>
+              <a:ext uri="{FF2B5EF4-FFF2-40B4-BE49-F238E27FC236}">
+                <a16:creationId xmlns:a16="http://schemas.microsoft.com/office/drawing/2014/main" id="{0E258788-0966-4660-A10B-576E2A940D4F}"/>
+              </a:ext>
+            </a:extLst>
+          </p:cNvPr>
+          <p:cNvSpPr txBox="1"/>
+          <p:nvPr/>
+        </p:nvSpPr>
+        <p:spPr>
+          <a:xfrm>
+            <a:off x="5855053" y="1830995"/>
+            <a:ext cx="675121" cy="369332"/>
+          </a:xfrm>
+          <a:prstGeom prst="rect">
+            <a:avLst/>
+          </a:prstGeom>
+          <a:noFill/>
+        </p:spPr>
+        <p:txBody>
+          <a:bodyPr wrap="none" rtlCol="0">
+            <a:spAutoFit/>
+          </a:bodyPr>
+          <a:lstStyle/>
+          <a:p>
+            <a:r>
+              <a:rPr lang="de-CH" dirty="0"/>
+              <a:t>HTTP</a:t>
+            </a:r>
+          </a:p>
+        </p:txBody>
+      </p:sp>
+      <p:sp>
+        <p:nvSpPr>
+          <p:cNvPr id="50" name="Textfeld 49">
+            <a:extLst>
+              <a:ext uri="{FF2B5EF4-FFF2-40B4-BE49-F238E27FC236}">
+                <a16:creationId xmlns:a16="http://schemas.microsoft.com/office/drawing/2014/main" id="{2DD38513-4DF8-45EE-9585-C2F3BD4E84B3}"/>
+              </a:ext>
+            </a:extLst>
+          </p:cNvPr>
+          <p:cNvSpPr txBox="1"/>
+          <p:nvPr/>
+        </p:nvSpPr>
+        <p:spPr>
+          <a:xfrm>
+            <a:off x="5859524" y="2956192"/>
+            <a:ext cx="675121" cy="369332"/>
+          </a:xfrm>
+          <a:prstGeom prst="rect">
+            <a:avLst/>
+          </a:prstGeom>
+          <a:noFill/>
+        </p:spPr>
+        <p:txBody>
+          <a:bodyPr wrap="none" rtlCol="0">
+            <a:spAutoFit/>
+          </a:bodyPr>
+          <a:lstStyle/>
+          <a:p>
+            <a:r>
+              <a:rPr lang="de-CH" dirty="0"/>
+              <a:t>HTTP</a:t>
+            </a:r>
+          </a:p>
+        </p:txBody>
+      </p:sp>
+      <p:sp>
+        <p:nvSpPr>
+          <p:cNvPr id="51" name="Textfeld 50">
+            <a:extLst>
+              <a:ext uri="{FF2B5EF4-FFF2-40B4-BE49-F238E27FC236}">
+                <a16:creationId xmlns:a16="http://schemas.microsoft.com/office/drawing/2014/main" id="{69E2D071-325F-4D7C-8AB3-BDEE8AE275CE}"/>
+              </a:ext>
+            </a:extLst>
+          </p:cNvPr>
+          <p:cNvSpPr txBox="1"/>
+          <p:nvPr/>
+        </p:nvSpPr>
+        <p:spPr>
+          <a:xfrm>
+            <a:off x="9448276" y="1818272"/>
+            <a:ext cx="675121" cy="369332"/>
+          </a:xfrm>
+          <a:prstGeom prst="rect">
+            <a:avLst/>
+          </a:prstGeom>
+          <a:noFill/>
+        </p:spPr>
+        <p:txBody>
+          <a:bodyPr wrap="none" rtlCol="0">
+            <a:spAutoFit/>
+          </a:bodyPr>
+          <a:lstStyle/>
+          <a:p>
+            <a:r>
+              <a:rPr lang="de-CH" dirty="0"/>
+              <a:t>HTTP</a:t>
+            </a:r>
+          </a:p>
+        </p:txBody>
+      </p:sp>
+      <p:sp>
+        <p:nvSpPr>
+          <p:cNvPr id="52" name="Textfeld 51">
+            <a:extLst>
+              <a:ext uri="{FF2B5EF4-FFF2-40B4-BE49-F238E27FC236}">
+                <a16:creationId xmlns:a16="http://schemas.microsoft.com/office/drawing/2014/main" id="{9E0E1986-2274-4A3A-8679-3BECB0A033C0}"/>
+              </a:ext>
+            </a:extLst>
+          </p:cNvPr>
+          <p:cNvSpPr txBox="1"/>
+          <p:nvPr/>
+        </p:nvSpPr>
+        <p:spPr>
+          <a:xfrm>
+            <a:off x="9448276" y="3408460"/>
+            <a:ext cx="675121" cy="369332"/>
+          </a:xfrm>
+          <a:prstGeom prst="rect">
+            <a:avLst/>
+          </a:prstGeom>
+          <a:noFill/>
+        </p:spPr>
+        <p:txBody>
+          <a:bodyPr wrap="none" rtlCol="0">
+            <a:spAutoFit/>
+          </a:bodyPr>
+          <a:lstStyle/>
+          <a:p>
+            <a:r>
+              <a:rPr lang="de-CH" dirty="0"/>
+              <a:t>HTTP</a:t>
+            </a:r>
+          </a:p>
+        </p:txBody>
+      </p:sp>
+      <p:sp>
+        <p:nvSpPr>
+          <p:cNvPr id="53" name="Flussdiagramm: Verbinder 52">
+            <a:extLst>
+              <a:ext uri="{FF2B5EF4-FFF2-40B4-BE49-F238E27FC236}">
+                <a16:creationId xmlns:a16="http://schemas.microsoft.com/office/drawing/2014/main" id="{E0A9A997-264D-4703-887D-4C39E53CF699}"/>
+              </a:ext>
+            </a:extLst>
+          </p:cNvPr>
+          <p:cNvSpPr/>
+          <p:nvPr/>
+        </p:nvSpPr>
+        <p:spPr>
+          <a:xfrm>
+            <a:off x="188385" y="3991777"/>
+            <a:ext cx="567257" cy="567257"/>
+          </a:xfrm>
+          <a:prstGeom prst="flowChartConnector">
+            <a:avLst/>
+          </a:prstGeom>
+          <a:ln>
+            <a:noFill/>
+          </a:ln>
+        </p:spPr>
+        <p:style>
+          <a:lnRef idx="1">
+            <a:schemeClr val="accent3"/>
+          </a:lnRef>
+          <a:fillRef idx="2">
+            <a:schemeClr val="accent3"/>
+          </a:fillRef>
+          <a:effectRef idx="1">
+            <a:schemeClr val="accent3"/>
+          </a:effectRef>
+          <a:fontRef idx="minor">
+            <a:schemeClr val="dk1"/>
+          </a:fontRef>
+        </p:style>
+        <p:txBody>
+          <a:bodyPr rtlCol="0" anchor="ctr"/>
+          <a:lstStyle/>
+          <a:p>
+            <a:pPr algn="ctr"/>
+            <a:r>
+              <a:rPr lang="de-CH" sz="1200" dirty="0"/>
+              <a:t>T1</a:t>
+            </a:r>
+          </a:p>
+        </p:txBody>
+      </p:sp>
+      <p:sp>
+        <p:nvSpPr>
+          <p:cNvPr id="55" name="Flussdiagramm: Verbinder 54">
+            <a:extLst>
+              <a:ext uri="{FF2B5EF4-FFF2-40B4-BE49-F238E27FC236}">
+                <a16:creationId xmlns:a16="http://schemas.microsoft.com/office/drawing/2014/main" id="{1D55A72F-C017-4C57-9A36-661D4FBB8079}"/>
+              </a:ext>
+            </a:extLst>
+          </p:cNvPr>
+          <p:cNvSpPr/>
+          <p:nvPr/>
+        </p:nvSpPr>
+        <p:spPr>
+          <a:xfrm>
+            <a:off x="828144" y="3991777"/>
+            <a:ext cx="567257" cy="567257"/>
+          </a:xfrm>
+          <a:prstGeom prst="flowChartConnector">
+            <a:avLst/>
+          </a:prstGeom>
+          <a:ln>
+            <a:noFill/>
+          </a:ln>
+        </p:spPr>
+        <p:style>
+          <a:lnRef idx="1">
+            <a:schemeClr val="accent3"/>
+          </a:lnRef>
+          <a:fillRef idx="2">
+            <a:schemeClr val="accent3"/>
+          </a:fillRef>
+          <a:effectRef idx="1">
+            <a:schemeClr val="accent3"/>
+          </a:effectRef>
+          <a:fontRef idx="minor">
+            <a:schemeClr val="dk1"/>
+          </a:fontRef>
+        </p:style>
+        <p:txBody>
+          <a:bodyPr rtlCol="0" anchor="ctr"/>
+          <a:lstStyle/>
+          <a:p>
+            <a:pPr algn="ctr"/>
+            <a:r>
+              <a:rPr lang="de-CH" sz="1200" dirty="0"/>
+              <a:t>T2</a:t>
+            </a:r>
+          </a:p>
+        </p:txBody>
+      </p:sp>
+      <p:sp>
+        <p:nvSpPr>
+          <p:cNvPr id="56" name="Flussdiagramm: Verbinder 55">
+            <a:extLst>
+              <a:ext uri="{FF2B5EF4-FFF2-40B4-BE49-F238E27FC236}">
+                <a16:creationId xmlns:a16="http://schemas.microsoft.com/office/drawing/2014/main" id="{782A5FEA-C67A-45C0-A927-397F10CED787}"/>
+              </a:ext>
+            </a:extLst>
+          </p:cNvPr>
+          <p:cNvSpPr/>
+          <p:nvPr/>
+        </p:nvSpPr>
+        <p:spPr>
+          <a:xfrm>
+            <a:off x="1468490" y="3991777"/>
+            <a:ext cx="567257" cy="567257"/>
+          </a:xfrm>
+          <a:prstGeom prst="flowChartConnector">
+            <a:avLst/>
+          </a:prstGeom>
+          <a:ln>
+            <a:noFill/>
+          </a:ln>
+        </p:spPr>
+        <p:style>
+          <a:lnRef idx="1">
+            <a:schemeClr val="accent3"/>
+          </a:lnRef>
+          <a:fillRef idx="2">
+            <a:schemeClr val="accent3"/>
+          </a:fillRef>
+          <a:effectRef idx="1">
+            <a:schemeClr val="accent3"/>
+          </a:effectRef>
+          <a:fontRef idx="minor">
+            <a:schemeClr val="dk1"/>
+          </a:fontRef>
+        </p:style>
+        <p:txBody>
+          <a:bodyPr rtlCol="0" anchor="ctr"/>
+          <a:lstStyle/>
+          <a:p>
+            <a:pPr algn="ctr"/>
+            <a:r>
+              <a:rPr lang="de-CH" sz="1200" dirty="0"/>
+              <a:t>R1</a:t>
+            </a:r>
+          </a:p>
+        </p:txBody>
+      </p:sp>
+      <p:sp>
+        <p:nvSpPr>
+          <p:cNvPr id="61" name="Flussdiagramm: Verbinder 60">
+            <a:extLst>
+              <a:ext uri="{FF2B5EF4-FFF2-40B4-BE49-F238E27FC236}">
+                <a16:creationId xmlns:a16="http://schemas.microsoft.com/office/drawing/2014/main" id="{AF72A3E6-1407-4E30-8E71-14C15BE4FA98}"/>
+              </a:ext>
+            </a:extLst>
+          </p:cNvPr>
+          <p:cNvSpPr/>
+          <p:nvPr/>
+        </p:nvSpPr>
+        <p:spPr>
+          <a:xfrm>
+            <a:off x="2103726" y="3991777"/>
+            <a:ext cx="567257" cy="567257"/>
+          </a:xfrm>
+          <a:prstGeom prst="flowChartConnector">
+            <a:avLst/>
+          </a:prstGeom>
+          <a:ln>
+            <a:noFill/>
+          </a:ln>
+        </p:spPr>
+        <p:style>
+          <a:lnRef idx="1">
+            <a:schemeClr val="accent3"/>
+          </a:lnRef>
+          <a:fillRef idx="2">
+            <a:schemeClr val="accent3"/>
+          </a:fillRef>
+          <a:effectRef idx="1">
+            <a:schemeClr val="accent3"/>
+          </a:effectRef>
+          <a:fontRef idx="minor">
+            <a:schemeClr val="dk1"/>
+          </a:fontRef>
+        </p:style>
+        <p:txBody>
+          <a:bodyPr rtlCol="0" anchor="ctr"/>
+          <a:lstStyle/>
+          <a:p>
+            <a:pPr algn="ctr"/>
+            <a:r>
+              <a:rPr lang="de-CH" sz="1200" dirty="0"/>
+              <a:t>R2</a:t>
+            </a:r>
+          </a:p>
+        </p:txBody>
+      </p:sp>
+      <p:sp>
+        <p:nvSpPr>
+          <p:cNvPr id="62" name="Flussdiagramm: Verbinder 61">
+            <a:extLst>
+              <a:ext uri="{FF2B5EF4-FFF2-40B4-BE49-F238E27FC236}">
+                <a16:creationId xmlns:a16="http://schemas.microsoft.com/office/drawing/2014/main" id="{7F882A68-9915-4402-B0F8-6E3514078D46}"/>
+              </a:ext>
+            </a:extLst>
+          </p:cNvPr>
+          <p:cNvSpPr/>
+          <p:nvPr/>
+        </p:nvSpPr>
+        <p:spPr>
+          <a:xfrm>
+            <a:off x="188385" y="4615473"/>
+            <a:ext cx="567257" cy="567257"/>
+          </a:xfrm>
+          <a:prstGeom prst="flowChartConnector">
+            <a:avLst/>
+          </a:prstGeom>
+          <a:ln>
+            <a:noFill/>
+          </a:ln>
+        </p:spPr>
+        <p:style>
+          <a:lnRef idx="1">
+            <a:schemeClr val="accent3"/>
+          </a:lnRef>
+          <a:fillRef idx="2">
+            <a:schemeClr val="accent3"/>
+          </a:fillRef>
+          <a:effectRef idx="1">
+            <a:schemeClr val="accent3"/>
+          </a:effectRef>
+          <a:fontRef idx="minor">
+            <a:schemeClr val="dk1"/>
+          </a:fontRef>
+        </p:style>
+        <p:txBody>
+          <a:bodyPr rtlCol="0" anchor="ctr"/>
+          <a:lstStyle/>
+          <a:p>
+            <a:pPr algn="ctr"/>
+            <a:r>
+              <a:rPr lang="de-CH" sz="1200" dirty="0"/>
+              <a:t>W1</a:t>
+            </a:r>
+          </a:p>
+        </p:txBody>
+      </p:sp>
+      <p:sp>
+        <p:nvSpPr>
+          <p:cNvPr id="63" name="Flussdiagramm: Verbinder 62">
+            <a:extLst>
+              <a:ext uri="{FF2B5EF4-FFF2-40B4-BE49-F238E27FC236}">
+                <a16:creationId xmlns:a16="http://schemas.microsoft.com/office/drawing/2014/main" id="{A397A58A-1A23-41F6-82DD-ECCE4ECDB5B7}"/>
+              </a:ext>
+            </a:extLst>
+          </p:cNvPr>
+          <p:cNvSpPr/>
+          <p:nvPr/>
+        </p:nvSpPr>
+        <p:spPr>
+          <a:xfrm>
+            <a:off x="828144" y="4615473"/>
+            <a:ext cx="567257" cy="567257"/>
+          </a:xfrm>
+          <a:prstGeom prst="flowChartConnector">
+            <a:avLst/>
+          </a:prstGeom>
+          <a:ln>
+            <a:noFill/>
+          </a:ln>
+        </p:spPr>
+        <p:style>
+          <a:lnRef idx="1">
+            <a:schemeClr val="accent3"/>
+          </a:lnRef>
+          <a:fillRef idx="2">
+            <a:schemeClr val="accent3"/>
+          </a:fillRef>
+          <a:effectRef idx="1">
+            <a:schemeClr val="accent3"/>
+          </a:effectRef>
+          <a:fontRef idx="minor">
+            <a:schemeClr val="dk1"/>
+          </a:fontRef>
+        </p:style>
+        <p:txBody>
+          <a:bodyPr rtlCol="0" anchor="ctr"/>
+          <a:lstStyle/>
+          <a:p>
+            <a:pPr algn="ctr"/>
+            <a:r>
+              <a:rPr lang="de-CH" sz="1200" dirty="0"/>
+              <a:t>W2</a:t>
+            </a:r>
+          </a:p>
+        </p:txBody>
+      </p:sp>
+      <p:sp>
+        <p:nvSpPr>
+          <p:cNvPr id="64" name="Flussdiagramm: Verbinder 63">
+            <a:extLst>
+              <a:ext uri="{FF2B5EF4-FFF2-40B4-BE49-F238E27FC236}">
+                <a16:creationId xmlns:a16="http://schemas.microsoft.com/office/drawing/2014/main" id="{2CC26623-F94C-45E2-B163-18618C661D40}"/>
+              </a:ext>
+            </a:extLst>
+          </p:cNvPr>
+          <p:cNvSpPr/>
+          <p:nvPr/>
+        </p:nvSpPr>
+        <p:spPr>
+          <a:xfrm>
+            <a:off x="1468490" y="4615473"/>
+            <a:ext cx="567257" cy="567257"/>
+          </a:xfrm>
+          <a:prstGeom prst="flowChartConnector">
+            <a:avLst/>
+          </a:prstGeom>
+          <a:ln>
+            <a:noFill/>
+          </a:ln>
+        </p:spPr>
+        <p:style>
+          <a:lnRef idx="1">
+            <a:schemeClr val="accent3"/>
+          </a:lnRef>
+          <a:fillRef idx="2">
+            <a:schemeClr val="accent3"/>
+          </a:fillRef>
+          <a:effectRef idx="1">
+            <a:schemeClr val="accent3"/>
+          </a:effectRef>
+          <a:fontRef idx="minor">
+            <a:schemeClr val="dk1"/>
+          </a:fontRef>
+        </p:style>
+        <p:txBody>
+          <a:bodyPr rtlCol="0" anchor="ctr"/>
+          <a:lstStyle/>
+          <a:p>
+            <a:pPr algn="ctr"/>
+            <a:r>
+              <a:rPr lang="de-CH" sz="1200" dirty="0"/>
+              <a:t>W3</a:t>
+            </a:r>
+          </a:p>
+        </p:txBody>
+      </p:sp>
+      <p:sp>
+        <p:nvSpPr>
+          <p:cNvPr id="65" name="Flussdiagramm: Verbinder 64">
+            <a:extLst>
+              <a:ext uri="{FF2B5EF4-FFF2-40B4-BE49-F238E27FC236}">
+                <a16:creationId xmlns:a16="http://schemas.microsoft.com/office/drawing/2014/main" id="{BF910184-C08D-460C-9639-388C7643DF46}"/>
+              </a:ext>
+            </a:extLst>
+          </p:cNvPr>
+          <p:cNvSpPr/>
+          <p:nvPr/>
+        </p:nvSpPr>
+        <p:spPr>
+          <a:xfrm>
+            <a:off x="2103726" y="4615473"/>
+            <a:ext cx="567257" cy="567257"/>
+          </a:xfrm>
+          <a:prstGeom prst="flowChartConnector">
+            <a:avLst/>
+          </a:prstGeom>
+          <a:ln>
+            <a:noFill/>
+          </a:ln>
+        </p:spPr>
+        <p:style>
+          <a:lnRef idx="1">
+            <a:schemeClr val="accent3"/>
+          </a:lnRef>
+          <a:fillRef idx="2">
+            <a:schemeClr val="accent3"/>
+          </a:fillRef>
+          <a:effectRef idx="1">
+            <a:schemeClr val="accent3"/>
+          </a:effectRef>
+          <a:fontRef idx="minor">
+            <a:schemeClr val="dk1"/>
+          </a:fontRef>
+        </p:style>
+        <p:txBody>
+          <a:bodyPr rtlCol="0" anchor="ctr"/>
+          <a:lstStyle/>
+          <a:p>
+            <a:pPr algn="ctr"/>
+            <a:r>
+              <a:rPr lang="de-CH" sz="1200" dirty="0"/>
+              <a:t>R3</a:t>
+            </a:r>
+          </a:p>
+        </p:txBody>
+      </p:sp>
+      <p:sp>
+        <p:nvSpPr>
+          <p:cNvPr id="68" name="Textfeld 67">
+            <a:extLst>
+              <a:ext uri="{FF2B5EF4-FFF2-40B4-BE49-F238E27FC236}">
+                <a16:creationId xmlns:a16="http://schemas.microsoft.com/office/drawing/2014/main" id="{EBAC8016-972C-4B2B-8CBE-BBD7D21B820E}"/>
+              </a:ext>
+            </a:extLst>
+          </p:cNvPr>
+          <p:cNvSpPr txBox="1"/>
+          <p:nvPr/>
+        </p:nvSpPr>
+        <p:spPr>
+          <a:xfrm>
+            <a:off x="219918" y="5695621"/>
+            <a:ext cx="2482597" cy="923330"/>
+          </a:xfrm>
+          <a:prstGeom prst="rect">
+            <a:avLst/>
+          </a:prstGeom>
+          <a:noFill/>
+        </p:spPr>
+        <p:txBody>
+          <a:bodyPr wrap="square" rtlCol="0">
+            <a:spAutoFit/>
+          </a:bodyPr>
+          <a:lstStyle/>
+          <a:p>
+            <a:r>
+              <a:rPr lang="de-CH" dirty="0"/>
+              <a:t>T   -&gt; </a:t>
+            </a:r>
+            <a:r>
+              <a:rPr lang="de-CH" dirty="0" err="1"/>
+              <a:t>Temp</a:t>
+            </a:r>
+            <a:r>
+              <a:rPr lang="de-CH" dirty="0"/>
+              <a:t> Sensor</a:t>
+            </a:r>
+          </a:p>
+          <a:p>
+            <a:r>
+              <a:rPr lang="de-CH" dirty="0"/>
+              <a:t>W -&gt; </a:t>
+            </a:r>
+            <a:r>
+              <a:rPr lang="de-CH" dirty="0" err="1"/>
+              <a:t>Water</a:t>
+            </a:r>
+            <a:r>
+              <a:rPr lang="de-CH" dirty="0"/>
+              <a:t> Level Sensor</a:t>
+            </a:r>
+            <a:br>
+              <a:rPr lang="de-CH" dirty="0"/>
+            </a:br>
+            <a:r>
+              <a:rPr lang="de-CH" dirty="0"/>
+              <a:t>R   -&gt; Relay </a:t>
+            </a:r>
+            <a:r>
+              <a:rPr lang="de-CH" dirty="0" err="1"/>
+              <a:t>Actuator</a:t>
+            </a:r>
+            <a:endParaRPr lang="de-CH" dirty="0"/>
+          </a:p>
+        </p:txBody>
+      </p:sp>
+      <p:cxnSp>
+        <p:nvCxnSpPr>
+          <p:cNvPr id="69" name="Gerader Verbinder 68">
+            <a:extLst>
+              <a:ext uri="{FF2B5EF4-FFF2-40B4-BE49-F238E27FC236}">
+                <a16:creationId xmlns:a16="http://schemas.microsoft.com/office/drawing/2014/main" id="{02EE039D-336F-4797-A358-C854CA8EF64C}"/>
+              </a:ext>
+            </a:extLst>
+          </p:cNvPr>
+          <p:cNvCxnSpPr>
+            <a:cxnSpLocks/>
+          </p:cNvCxnSpPr>
+          <p:nvPr/>
+        </p:nvCxnSpPr>
+        <p:spPr>
+          <a:xfrm flipV="1">
+            <a:off x="7083875" y="4010596"/>
+            <a:ext cx="3898559" cy="2211757"/>
+          </a:xfrm>
+          <a:prstGeom prst="line">
+            <a:avLst/>
+          </a:prstGeom>
+          <a:ln w="38100" cap="flat" cmpd="sng" algn="ctr">
+            <a:solidFill>
+              <a:srgbClr val="00B0F0"/>
+            </a:solidFill>
+            <a:prstDash val="dash"/>
+            <a:round/>
+            <a:headEnd type="none" w="med" len="med"/>
+            <a:tailEnd type="none" w="med" len="med"/>
+          </a:ln>
+        </p:spPr>
+        <p:style>
+          <a:lnRef idx="0">
+            <a:scrgbClr r="0" g="0" b="0"/>
+          </a:lnRef>
+          <a:fillRef idx="0">
+            <a:scrgbClr r="0" g="0" b="0"/>
+          </a:fillRef>
+          <a:effectRef idx="0">
+            <a:scrgbClr r="0" g="0" b="0"/>
+          </a:effectRef>
+          <a:fontRef idx="minor">
+            <a:schemeClr val="tx1"/>
+          </a:fontRef>
+        </p:style>
+      </p:cxnSp>
+      <p:cxnSp>
+        <p:nvCxnSpPr>
+          <p:cNvPr id="72" name="Gerader Verbinder 71">
+            <a:extLst>
+              <a:ext uri="{FF2B5EF4-FFF2-40B4-BE49-F238E27FC236}">
+                <a16:creationId xmlns:a16="http://schemas.microsoft.com/office/drawing/2014/main" id="{47A75716-86C8-45D6-8A83-7DA3DFEE189E}"/>
+              </a:ext>
+            </a:extLst>
+          </p:cNvPr>
+          <p:cNvCxnSpPr>
+            <a:cxnSpLocks/>
+          </p:cNvCxnSpPr>
+          <p:nvPr/>
+        </p:nvCxnSpPr>
+        <p:spPr>
+          <a:xfrm>
+            <a:off x="1142998" y="3609826"/>
+            <a:ext cx="0" cy="229739"/>
+          </a:xfrm>
+          <a:prstGeom prst="line">
+            <a:avLst/>
+          </a:prstGeom>
+          <a:ln w="38100">
+            <a:solidFill>
+              <a:schemeClr val="tx1"/>
+            </a:solidFill>
+          </a:ln>
+        </p:spPr>
+        <p:style>
+          <a:lnRef idx="1">
+            <a:schemeClr val="accent1"/>
+          </a:lnRef>
+          <a:fillRef idx="0">
+            <a:schemeClr val="accent1"/>
+          </a:fillRef>
+          <a:effectRef idx="0">
+            <a:schemeClr val="accent1"/>
+          </a:effectRef>
+          <a:fontRef idx="minor">
+            <a:schemeClr val="tx1"/>
+          </a:fontRef>
+        </p:style>
+      </p:cxnSp>
+    </p:spTree>
+    <p:extLst>
+      <p:ext uri="{BB962C8B-B14F-4D97-AF65-F5344CB8AC3E}">
+        <p14:creationId xmlns:p14="http://schemas.microsoft.com/office/powerpoint/2010/main" val="172409514"/>
+      </p:ext>
+    </p:extLst>
+  </p:cSld>
+  <p:clrMapOvr>
+    <a:masterClrMapping/>
+  </p:clrMapOvr>
+</p:sld>
+</file>
+
+<file path=ppt/slides/slide3.xml><?xml version="1.0" encoding="utf-8"?>
+<p:sld xmlns:a="http://schemas.openxmlformats.org/drawingml/2006/main" xmlns:r="http://schemas.openxmlformats.org/officeDocument/2006/relationships" xmlns:p="http://schemas.openxmlformats.org/presentationml/2006/main">
+  <p:cSld>
+    <p:spTree>
+      <p:nvGrpSpPr>
+        <p:cNvPr id="1" name=""/>
+        <p:cNvGrpSpPr/>
+        <p:nvPr/>
+      </p:nvGrpSpPr>
+      <p:grpSpPr>
+        <a:xfrm>
+          <a:off x="0" y="0"/>
+          <a:ext cx="0" cy="0"/>
+          <a:chOff x="0" y="0"/>
+          <a:chExt cx="0" cy="0"/>
+        </a:xfrm>
+      </p:grpSpPr>
+      <p:sp>
+        <p:nvSpPr>
+          <p:cNvPr id="2" name="Titel 1">
+            <a:extLst>
+              <a:ext uri="{FF2B5EF4-FFF2-40B4-BE49-F238E27FC236}">
+                <a16:creationId xmlns:a16="http://schemas.microsoft.com/office/drawing/2014/main" id="{A16DBF3D-B736-4A2A-AE14-A24F29CAB9E9}"/>
+              </a:ext>
+            </a:extLst>
+          </p:cNvPr>
+          <p:cNvSpPr>
+            <a:spLocks noGrp="1"/>
+          </p:cNvSpPr>
+          <p:nvPr>
+            <p:ph type="title"/>
+          </p:nvPr>
+        </p:nvSpPr>
+        <p:spPr/>
+        <p:txBody>
+          <a:bodyPr/>
+          <a:lstStyle/>
+          <a:p>
+            <a:r>
+              <a:rPr lang="de-CH" dirty="0"/>
+              <a:t>Use </a:t>
+            </a:r>
+            <a:r>
+              <a:rPr lang="de-CH" dirty="0" err="1"/>
+              <a:t>cases</a:t>
+            </a:r>
+            <a:endParaRPr lang="de-CH" dirty="0"/>
+          </a:p>
+        </p:txBody>
+      </p:sp>
+      <p:sp>
+        <p:nvSpPr>
+          <p:cNvPr id="3" name="Inhaltsplatzhalter 2">
+            <a:extLst>
+              <a:ext uri="{FF2B5EF4-FFF2-40B4-BE49-F238E27FC236}">
+                <a16:creationId xmlns:a16="http://schemas.microsoft.com/office/drawing/2014/main" id="{8038CF11-800A-42F1-96F8-5DB51DADDB5B}"/>
+              </a:ext>
+            </a:extLst>
+          </p:cNvPr>
+          <p:cNvSpPr>
+            <a:spLocks noGrp="1"/>
+          </p:cNvSpPr>
+          <p:nvPr>
+            <p:ph idx="1"/>
+          </p:nvPr>
+        </p:nvSpPr>
+        <p:spPr/>
+        <p:txBody>
+          <a:bodyPr/>
+          <a:lstStyle/>
+          <a:p>
+            <a:r>
+              <a:rPr lang="de-CH" dirty="0" err="1"/>
+              <a:t>Measure</a:t>
+            </a:r>
+            <a:r>
+              <a:rPr lang="de-CH" dirty="0"/>
+              <a:t> </a:t>
+            </a:r>
+            <a:r>
+              <a:rPr lang="de-CH" dirty="0" err="1"/>
+              <a:t>water</a:t>
+            </a:r>
+            <a:r>
+              <a:rPr lang="de-CH" dirty="0"/>
+              <a:t> </a:t>
+            </a:r>
+            <a:r>
+              <a:rPr lang="de-CH" dirty="0" err="1"/>
+              <a:t>temperature</a:t>
+            </a:r>
+            <a:endParaRPr lang="de-CH" dirty="0"/>
+          </a:p>
+          <a:p>
+            <a:r>
+              <a:rPr lang="de-CH" dirty="0"/>
+              <a:t>Switch on / off </a:t>
+            </a:r>
+            <a:r>
+              <a:rPr lang="de-CH" dirty="0" err="1"/>
+              <a:t>reef</a:t>
+            </a:r>
+            <a:r>
+              <a:rPr lang="de-CH" dirty="0"/>
+              <a:t> </a:t>
+            </a:r>
+            <a:r>
+              <a:rPr lang="de-CH" dirty="0" err="1"/>
+              <a:t>aquarium</a:t>
+            </a:r>
+            <a:r>
+              <a:rPr lang="de-CH" dirty="0"/>
+              <a:t> </a:t>
+            </a:r>
+            <a:r>
+              <a:rPr lang="de-CH" dirty="0" err="1"/>
+              <a:t>led</a:t>
+            </a:r>
+            <a:endParaRPr lang="de-CH" dirty="0"/>
+          </a:p>
+          <a:p>
+            <a:r>
+              <a:rPr lang="de-CH" dirty="0"/>
+              <a:t>Refill </a:t>
+            </a:r>
+            <a:r>
+              <a:rPr lang="de-CH" dirty="0" err="1"/>
+              <a:t>evaporated</a:t>
+            </a:r>
+            <a:r>
+              <a:rPr lang="de-CH" dirty="0"/>
+              <a:t> RODI </a:t>
+            </a:r>
+            <a:r>
+              <a:rPr lang="de-CH" dirty="0" err="1"/>
+              <a:t>water</a:t>
+            </a:r>
+            <a:endParaRPr lang="de-CH" dirty="0"/>
+          </a:p>
+          <a:p>
+            <a:r>
+              <a:rPr lang="de-CH" dirty="0"/>
+              <a:t>Send Twitter DM </a:t>
+            </a:r>
+            <a:r>
+              <a:rPr lang="de-CH" dirty="0" err="1"/>
+              <a:t>to</a:t>
+            </a:r>
+            <a:r>
+              <a:rPr lang="de-CH" dirty="0"/>
+              <a:t> </a:t>
+            </a:r>
+            <a:r>
+              <a:rPr lang="de-CH" dirty="0" err="1"/>
+              <a:t>reef</a:t>
+            </a:r>
+            <a:r>
+              <a:rPr lang="de-CH" dirty="0"/>
+              <a:t> </a:t>
+            </a:r>
+            <a:r>
+              <a:rPr lang="de-CH" dirty="0" err="1"/>
+              <a:t>owner</a:t>
+            </a:r>
+            <a:endParaRPr lang="de-CH" dirty="0"/>
+          </a:p>
+          <a:p>
+            <a:r>
+              <a:rPr lang="de-CH" dirty="0"/>
+              <a:t>Display </a:t>
+            </a:r>
+            <a:r>
+              <a:rPr lang="de-CH" dirty="0" err="1"/>
+              <a:t>sensor</a:t>
+            </a:r>
+            <a:r>
+              <a:rPr lang="de-CH" dirty="0"/>
+              <a:t> and </a:t>
+            </a:r>
+            <a:r>
+              <a:rPr lang="de-CH" dirty="0" err="1"/>
+              <a:t>actuator</a:t>
+            </a:r>
+            <a:r>
+              <a:rPr lang="de-CH" dirty="0"/>
+              <a:t> </a:t>
+            </a:r>
+            <a:r>
+              <a:rPr lang="de-CH" dirty="0" err="1"/>
+              <a:t>data</a:t>
+            </a:r>
+            <a:r>
+              <a:rPr lang="de-CH" dirty="0"/>
+              <a:t> on </a:t>
+            </a:r>
+            <a:r>
+              <a:rPr lang="de-CH" dirty="0" err="1"/>
+              <a:t>ThingSpeak</a:t>
+            </a:r>
+            <a:endParaRPr lang="de-CH" dirty="0"/>
+          </a:p>
+        </p:txBody>
+      </p:sp>
+    </p:spTree>
+    <p:extLst>
+      <p:ext uri="{BB962C8B-B14F-4D97-AF65-F5344CB8AC3E}">
+        <p14:creationId xmlns:p14="http://schemas.microsoft.com/office/powerpoint/2010/main" val="4064571456"/>
+      </p:ext>
+    </p:extLst>
+  </p:cSld>
+  <p:clrMapOvr>
+    <a:masterClrMapping/>
+  </p:clrMapOvr>
+</p:sld>
+</file>
+
+<file path=ppt/slides/slide4.xml><?xml version="1.0" encoding="utf-8"?>
+<p:sld xmlns:a="http://schemas.openxmlformats.org/drawingml/2006/main" xmlns:r="http://schemas.openxmlformats.org/officeDocument/2006/relationships" xmlns:p="http://schemas.openxmlformats.org/presentationml/2006/main">
+  <p:cSld>
+    <p:spTree>
+      <p:nvGrpSpPr>
+        <p:cNvPr id="1" name=""/>
+        <p:cNvGrpSpPr/>
+        <p:nvPr/>
+      </p:nvGrpSpPr>
+      <p:grpSpPr>
+        <a:xfrm>
+          <a:off x="0" y="0"/>
+          <a:ext cx="0" cy="0"/>
+          <a:chOff x="0" y="0"/>
+          <a:chExt cx="0" cy="0"/>
+        </a:xfrm>
+      </p:grpSpPr>
+      <p:sp>
+        <p:nvSpPr>
+          <p:cNvPr id="2" name="Titel 1">
+            <a:extLst>
+              <a:ext uri="{FF2B5EF4-FFF2-40B4-BE49-F238E27FC236}">
+                <a16:creationId xmlns:a16="http://schemas.microsoft.com/office/drawing/2014/main" id="{99F06542-6E84-4E17-859D-B565DCF95E47}"/>
+              </a:ext>
+            </a:extLst>
+          </p:cNvPr>
+          <p:cNvSpPr>
+            <a:spLocks noGrp="1"/>
+          </p:cNvSpPr>
+          <p:nvPr>
+            <p:ph type="title"/>
+          </p:nvPr>
+        </p:nvSpPr>
+        <p:spPr/>
+        <p:txBody>
+          <a:bodyPr/>
+          <a:lstStyle/>
+          <a:p>
+            <a:r>
+              <a:rPr lang="de-CH" dirty="0"/>
+              <a:t>Interface </a:t>
+            </a:r>
+            <a:r>
+              <a:rPr lang="de-CH" dirty="0" err="1"/>
+              <a:t>documentation</a:t>
+            </a:r>
+            <a:r>
+              <a:rPr lang="de-CH" dirty="0"/>
+              <a:t> </a:t>
+            </a:r>
+          </a:p>
+        </p:txBody>
+      </p:sp>
+      <p:sp>
+        <p:nvSpPr>
+          <p:cNvPr id="3" name="Inhaltsplatzhalter 2">
+            <a:extLst>
+              <a:ext uri="{FF2B5EF4-FFF2-40B4-BE49-F238E27FC236}">
+                <a16:creationId xmlns:a16="http://schemas.microsoft.com/office/drawing/2014/main" id="{60B7D111-D17B-4DF5-BA70-185E975B1BF2}"/>
+              </a:ext>
+            </a:extLst>
+          </p:cNvPr>
+          <p:cNvSpPr>
+            <a:spLocks noGrp="1"/>
+          </p:cNvSpPr>
+          <p:nvPr>
+            <p:ph idx="1"/>
+          </p:nvPr>
+        </p:nvSpPr>
+        <p:spPr/>
+        <p:txBody>
+          <a:bodyPr>
+            <a:normAutofit fontScale="77500" lnSpcReduction="20000"/>
+          </a:bodyPr>
+          <a:lstStyle/>
+          <a:p>
+            <a:pPr marL="0" indent="0">
+              <a:buNone/>
+            </a:pPr>
+            <a:r>
+              <a:rPr lang="de-CH" dirty="0"/>
+              <a:t>HTTP API </a:t>
+            </a:r>
+            <a:r>
+              <a:rPr lang="de-CH" dirty="0" err="1"/>
+              <a:t>to</a:t>
+            </a:r>
+            <a:r>
+              <a:rPr lang="de-CH" dirty="0"/>
+              <a:t> </a:t>
+            </a:r>
+            <a:r>
+              <a:rPr lang="de-CH" dirty="0" err="1"/>
+              <a:t>write</a:t>
+            </a:r>
+            <a:r>
+              <a:rPr lang="de-CH" dirty="0"/>
+              <a:t> </a:t>
+            </a:r>
+            <a:r>
+              <a:rPr lang="de-CH" dirty="0" err="1"/>
+              <a:t>ThingSpeak</a:t>
+            </a:r>
+            <a:endParaRPr lang="de-CH" dirty="0"/>
+          </a:p>
+          <a:p>
+            <a:pPr marL="0" indent="0">
+              <a:buNone/>
+            </a:pPr>
+            <a:r>
+              <a:rPr lang="de-CH" dirty="0"/>
+              <a:t>$ </a:t>
+            </a:r>
+            <a:r>
+              <a:rPr lang="de-CH" dirty="0" err="1"/>
+              <a:t>curl</a:t>
+            </a:r>
+            <a:r>
+              <a:rPr lang="de-CH" dirty="0"/>
+              <a:t> -</a:t>
+            </a:r>
+            <a:r>
+              <a:rPr lang="de-CH" dirty="0" err="1"/>
+              <a:t>vX</a:t>
+            </a:r>
+            <a:r>
+              <a:rPr lang="de-CH" dirty="0"/>
+              <a:t> POST https://api.thingspeak.com/update.json --</a:t>
+            </a:r>
+            <a:r>
+              <a:rPr lang="de-CH" dirty="0" err="1"/>
+              <a:t>data</a:t>
+            </a:r>
+            <a:r>
+              <a:rPr lang="de-CH" dirty="0"/>
+              <a:t> '</a:t>
+            </a:r>
+            <a:r>
+              <a:rPr lang="de-CH" dirty="0" err="1"/>
+              <a:t>api_key</a:t>
+            </a:r>
+            <a:r>
+              <a:rPr lang="de-CH" dirty="0"/>
+              <a:t>==WRITE_API_KEY&amp;field1=TEMP_GROUND&amp;field2=TEMP_SURFACE&amp;field3=WATER_REEF_MIN&amp;field4=WATER_REEF_MAX&amp;field5=WATER_REFILL_MIN&amp;field6=LAMP_LEFT_STATE&amp;field7=LAMP_RIGHT_STATE&amp;field8=REFILL_PUMP_STATE’</a:t>
+            </a:r>
+          </a:p>
+          <a:p>
+            <a:pPr marL="0" indent="0">
+              <a:buNone/>
+            </a:pPr>
+            <a:r>
+              <a:rPr lang="de-CH" dirty="0"/>
+              <a:t>HTTP API </a:t>
+            </a:r>
+            <a:r>
+              <a:rPr lang="de-CH" dirty="0" err="1"/>
+              <a:t>to</a:t>
+            </a:r>
+            <a:r>
+              <a:rPr lang="de-CH" dirty="0"/>
+              <a:t> </a:t>
+            </a:r>
+            <a:r>
+              <a:rPr lang="de-CH" dirty="0" err="1"/>
+              <a:t>write</a:t>
+            </a:r>
+            <a:r>
+              <a:rPr lang="de-CH" dirty="0"/>
+              <a:t> Twitter DM</a:t>
+            </a:r>
+          </a:p>
+          <a:p>
+            <a:pPr marL="0" indent="0">
+              <a:buNone/>
+            </a:pPr>
+            <a:r>
+              <a:rPr lang="de-CH" dirty="0" err="1"/>
+              <a:t>curl</a:t>
+            </a:r>
+            <a:r>
+              <a:rPr lang="de-CH" dirty="0"/>
+              <a:t> --</a:t>
+            </a:r>
+            <a:r>
+              <a:rPr lang="de-CH" dirty="0" err="1"/>
+              <a:t>request</a:t>
+            </a:r>
+            <a:r>
+              <a:rPr lang="de-CH" dirty="0"/>
+              <a:t> POST --</a:t>
+            </a:r>
+            <a:r>
+              <a:rPr lang="de-CH" dirty="0" err="1"/>
+              <a:t>url</a:t>
+            </a:r>
+            <a:r>
+              <a:rPr lang="de-CH" dirty="0"/>
+              <a:t> https://api.twitter.com/1.1/direct_messages/events/new.json --header '</a:t>
+            </a:r>
+            <a:r>
+              <a:rPr lang="de-CH" dirty="0" err="1"/>
+              <a:t>authorization</a:t>
+            </a:r>
+            <a:r>
+              <a:rPr lang="de-CH" dirty="0"/>
+              <a:t>: OAuth </a:t>
+            </a:r>
+            <a:r>
+              <a:rPr lang="de-CH" dirty="0" err="1"/>
+              <a:t>oauth_consumer_key</a:t>
+            </a:r>
+            <a:r>
+              <a:rPr lang="de-CH" dirty="0"/>
+              <a:t>="CONSUMER_KEY", </a:t>
+            </a:r>
+            <a:r>
+              <a:rPr lang="de-CH" dirty="0" err="1"/>
+              <a:t>oauth_nonce</a:t>
+            </a:r>
+            <a:r>
+              <a:rPr lang="de-CH" dirty="0"/>
+              <a:t>="AUTO_GENERATED_NONCE", </a:t>
+            </a:r>
+            <a:r>
+              <a:rPr lang="de-CH" dirty="0" err="1"/>
+              <a:t>oauth_signature</a:t>
+            </a:r>
+            <a:r>
+              <a:rPr lang="de-CH" dirty="0"/>
+              <a:t>="AUTO_GENERATED_SIGNATURE", </a:t>
+            </a:r>
+            <a:r>
+              <a:rPr lang="de-CH" dirty="0" err="1"/>
+              <a:t>oauth_signature_method</a:t>
+            </a:r>
+            <a:r>
+              <a:rPr lang="de-CH" dirty="0"/>
+              <a:t>="HMAC-SHA1", </a:t>
+            </a:r>
+            <a:r>
+              <a:rPr lang="de-CH" dirty="0" err="1"/>
+              <a:t>oauth_timestamp</a:t>
+            </a:r>
+            <a:r>
+              <a:rPr lang="de-CH" dirty="0"/>
+              <a:t>="AUTO_GENERATED_TIMESTAMP", </a:t>
+            </a:r>
+            <a:r>
+              <a:rPr lang="de-CH" dirty="0" err="1"/>
+              <a:t>oauth_token</a:t>
+            </a:r>
+            <a:r>
+              <a:rPr lang="de-CH" dirty="0"/>
+              <a:t>="USERS_ACCESS_TOKEN", </a:t>
+            </a:r>
+            <a:r>
+              <a:rPr lang="de-CH" dirty="0" err="1"/>
+              <a:t>oauth_version</a:t>
+            </a:r>
+            <a:r>
+              <a:rPr lang="de-CH" dirty="0"/>
+              <a:t>="1.0"' --header '</a:t>
+            </a:r>
+            <a:r>
+              <a:rPr lang="de-CH" dirty="0" err="1"/>
+              <a:t>content</a:t>
+            </a:r>
+            <a:r>
+              <a:rPr lang="de-CH" dirty="0"/>
+              <a:t>-type: </a:t>
+            </a:r>
+            <a:r>
+              <a:rPr lang="de-CH" dirty="0" err="1"/>
+              <a:t>application</a:t>
+            </a:r>
+            <a:r>
+              <a:rPr lang="de-CH" dirty="0"/>
+              <a:t>/</a:t>
+            </a:r>
+            <a:r>
+              <a:rPr lang="de-CH" dirty="0" err="1"/>
+              <a:t>json</a:t>
+            </a:r>
+            <a:r>
+              <a:rPr lang="de-CH" dirty="0"/>
+              <a:t>' --</a:t>
+            </a:r>
+            <a:r>
+              <a:rPr lang="de-CH" dirty="0" err="1"/>
+              <a:t>data</a:t>
+            </a:r>
+            <a:r>
+              <a:rPr lang="de-CH" dirty="0"/>
+              <a:t> '{"</a:t>
+            </a:r>
+            <a:r>
+              <a:rPr lang="de-CH" dirty="0" err="1"/>
+              <a:t>event</a:t>
+            </a:r>
+            <a:r>
+              <a:rPr lang="de-CH" dirty="0"/>
+              <a:t>": {"type": "</a:t>
+            </a:r>
+            <a:r>
+              <a:rPr lang="de-CH" dirty="0" err="1"/>
+              <a:t>message_create</a:t>
+            </a:r>
+            <a:r>
+              <a:rPr lang="de-CH" dirty="0"/>
+              <a:t>", "</a:t>
+            </a:r>
+            <a:r>
+              <a:rPr lang="de-CH" dirty="0" err="1"/>
+              <a:t>message_create</a:t>
+            </a:r>
+            <a:r>
+              <a:rPr lang="de-CH" dirty="0"/>
+              <a:t>": {"</a:t>
+            </a:r>
+            <a:r>
+              <a:rPr lang="de-CH" dirty="0" err="1"/>
+              <a:t>target</a:t>
+            </a:r>
+            <a:r>
+              <a:rPr lang="de-CH" dirty="0"/>
+              <a:t>": {"</a:t>
+            </a:r>
+            <a:r>
+              <a:rPr lang="de-CH" dirty="0" err="1"/>
+              <a:t>recipient_id</a:t>
+            </a:r>
+            <a:r>
+              <a:rPr lang="de-CH" dirty="0"/>
+              <a:t>": "RECIPIENT_USER_ID"}, "</a:t>
+            </a:r>
+            <a:r>
+              <a:rPr lang="de-CH" dirty="0" err="1"/>
+              <a:t>message_data</a:t>
+            </a:r>
+            <a:r>
+              <a:rPr lang="de-CH" dirty="0"/>
+              <a:t>": {"</a:t>
+            </a:r>
+            <a:r>
+              <a:rPr lang="de-CH" dirty="0" err="1"/>
+              <a:t>text</a:t>
+            </a:r>
+            <a:r>
+              <a:rPr lang="de-CH" dirty="0"/>
+              <a:t>": MESSAGE_TEXT}}}}'</a:t>
+            </a:r>
+          </a:p>
+          <a:p>
+            <a:pPr marL="0" indent="0">
+              <a:buNone/>
+            </a:pPr>
+            <a:endParaRPr lang="de-CH" dirty="0"/>
+          </a:p>
+        </p:txBody>
+      </p:sp>
+    </p:spTree>
+    <p:extLst>
+      <p:ext uri="{BB962C8B-B14F-4D97-AF65-F5344CB8AC3E}">
+        <p14:creationId xmlns:p14="http://schemas.microsoft.com/office/powerpoint/2010/main" val="3237223243"/>
+      </p:ext>
+    </p:extLst>
+  </p:cSld>
+  <p:clrMapOvr>
+    <a:masterClrMapping/>
+  </p:clrMapOvr>
+</p:sld>
+</file>
+
+<file path=ppt/slides/slide5.xml><?xml version="1.0" encoding="utf-8"?>
+<p:sld xmlns:a="http://schemas.openxmlformats.org/drawingml/2006/main" xmlns:r="http://schemas.openxmlformats.org/officeDocument/2006/relationships" xmlns:p="http://schemas.openxmlformats.org/presentationml/2006/main">
+  <p:cSld>
+    <p:spTree>
+      <p:nvGrpSpPr>
+        <p:cNvPr id="1" name=""/>
+        <p:cNvGrpSpPr/>
+        <p:nvPr/>
+      </p:nvGrpSpPr>
+      <p:grpSpPr>
+        <a:xfrm>
+          <a:off x="0" y="0"/>
+          <a:ext cx="0" cy="0"/>
+          <a:chOff x="0" y="0"/>
+          <a:chExt cx="0" cy="0"/>
+        </a:xfrm>
+      </p:grpSpPr>
+      <p:sp>
+        <p:nvSpPr>
+          <p:cNvPr id="2" name="Titel 1">
+            <a:extLst>
+              <a:ext uri="{FF2B5EF4-FFF2-40B4-BE49-F238E27FC236}">
+                <a16:creationId xmlns:a16="http://schemas.microsoft.com/office/drawing/2014/main" id="{24AFF9E4-6045-43EA-853B-FF530A3B05B9}"/>
+              </a:ext>
+            </a:extLst>
+          </p:cNvPr>
+          <p:cNvSpPr>
+            <a:spLocks noGrp="1"/>
+          </p:cNvSpPr>
+          <p:nvPr>
+            <p:ph type="title"/>
+          </p:nvPr>
+        </p:nvSpPr>
+        <p:spPr/>
+        <p:txBody>
+          <a:bodyPr/>
+          <a:lstStyle/>
+          <a:p>
+            <a:r>
+              <a:rPr lang="de-CH" dirty="0" err="1"/>
+              <a:t>Issues</a:t>
+            </a:r>
+            <a:endParaRPr lang="de-CH" dirty="0"/>
+          </a:p>
+        </p:txBody>
+      </p:sp>
+      <p:sp>
+        <p:nvSpPr>
+          <p:cNvPr id="3" name="Inhaltsplatzhalter 2">
+            <a:extLst>
+              <a:ext uri="{FF2B5EF4-FFF2-40B4-BE49-F238E27FC236}">
+                <a16:creationId xmlns:a16="http://schemas.microsoft.com/office/drawing/2014/main" id="{843E4616-9D9B-479C-BDC5-8DFE5BDA1691}"/>
+              </a:ext>
+            </a:extLst>
+          </p:cNvPr>
+          <p:cNvSpPr>
+            <a:spLocks noGrp="1"/>
+          </p:cNvSpPr>
+          <p:nvPr>
+            <p:ph idx="1"/>
+          </p:nvPr>
+        </p:nvSpPr>
+        <p:spPr/>
+        <p:txBody>
+          <a:bodyPr>
+            <a:normAutofit/>
+          </a:bodyPr>
+          <a:lstStyle/>
+          <a:p>
+            <a:pPr marL="0" indent="0">
+              <a:buNone/>
+            </a:pPr>
+            <a:r>
+              <a:rPr lang="en-US" dirty="0" err="1"/>
+              <a:t>ThingSpeak</a:t>
+            </a:r>
+            <a:r>
+              <a:rPr lang="en-US" dirty="0"/>
+              <a:t> write restriction</a:t>
+            </a:r>
+          </a:p>
+          <a:p>
+            <a:pPr marL="0" indent="0">
+              <a:buNone/>
+            </a:pPr>
+            <a:r>
+              <a:rPr lang="en-US" dirty="0"/>
+              <a:t>Pull-up and pull-down resistors and the correct resistor size</a:t>
+            </a:r>
+          </a:p>
+          <a:p>
+            <a:pPr marL="0" indent="0">
+              <a:buNone/>
+            </a:pPr>
+            <a:r>
+              <a:rPr lang="en-US" dirty="0"/>
+              <a:t>Soldering</a:t>
+            </a:r>
+          </a:p>
+          <a:p>
+            <a:pPr marL="0" indent="0">
+              <a:buNone/>
+            </a:pPr>
+            <a:r>
+              <a:rPr lang="en-US" dirty="0"/>
+              <a:t>Attaching the water level sensors to my reef aquarium</a:t>
+            </a:r>
+          </a:p>
+          <a:p>
+            <a:pPr marL="0" indent="0">
+              <a:buNone/>
+            </a:pPr>
+            <a:r>
+              <a:rPr lang="en-US" dirty="0"/>
+              <a:t>Random Twitter DM caused by a magnetic field</a:t>
+            </a:r>
+          </a:p>
+          <a:p>
+            <a:pPr marL="0" indent="0">
+              <a:buNone/>
+            </a:pPr>
+            <a:r>
+              <a:rPr lang="en-US" dirty="0"/>
+              <a:t>Twitter </a:t>
+            </a:r>
+            <a:r>
+              <a:rPr lang="en-US" dirty="0" err="1"/>
+              <a:t>Oauth</a:t>
+            </a:r>
+            <a:r>
+              <a:rPr lang="en-US" dirty="0"/>
+              <a:t> 1.0 </a:t>
+            </a:r>
+            <a:r>
+              <a:rPr lang="en-US" dirty="0" err="1"/>
+              <a:t>authentificaiton</a:t>
+            </a:r>
+            <a:endParaRPr lang="de-CH" dirty="0"/>
+          </a:p>
+        </p:txBody>
+      </p:sp>
+    </p:spTree>
+    <p:extLst>
+      <p:ext uri="{BB962C8B-B14F-4D97-AF65-F5344CB8AC3E}">
+        <p14:creationId xmlns:p14="http://schemas.microsoft.com/office/powerpoint/2010/main" val="2860997141"/>
       </p:ext>
     </p:extLst>
   </p:cSld>
@@ -3721,4 +6604,299 @@
     </a:ext>
   </a:extLst>
 </a:theme>
+</file>
+
+<file path=ppt/theme/theme2.xml><?xml version="1.0" encoding="utf-8"?>
+<a:theme xmlns:a="http://schemas.openxmlformats.org/drawingml/2006/main" name="Office">
+  <a:themeElements>
+    <a:clrScheme name="Office">
+      <a:dk1>
+        <a:sysClr val="windowText" lastClr="000000"/>
+      </a:dk1>
+      <a:lt1>
+        <a:sysClr val="window" lastClr="FFFFFF"/>
+      </a:lt1>
+      <a:dk2>
+        <a:srgbClr val="44546A"/>
+      </a:dk2>
+      <a:lt2>
+        <a:srgbClr val="E7E6E6"/>
+      </a:lt2>
+      <a:accent1>
+        <a:srgbClr val="4472C4"/>
+      </a:accent1>
+      <a:accent2>
+        <a:srgbClr val="ED7D31"/>
+      </a:accent2>
+      <a:accent3>
+        <a:srgbClr val="A5A5A5"/>
+      </a:accent3>
+      <a:accent4>
+        <a:srgbClr val="FFC000"/>
+      </a:accent4>
+      <a:accent5>
+        <a:srgbClr val="5B9BD5"/>
+      </a:accent5>
+      <a:accent6>
+        <a:srgbClr val="70AD47"/>
+      </a:accent6>
+      <a:hlink>
+        <a:srgbClr val="0563C1"/>
+      </a:hlink>
+      <a:folHlink>
+        <a:srgbClr val="954F72"/>
+      </a:folHlink>
+    </a:clrScheme>
+    <a:fontScheme name="Office">
+      <a:majorFont>
+        <a:latin typeface="Calibri Light" panose="020F0302020204030204"/>
+        <a:ea typeface=""/>
+        <a:cs typeface=""/>
+        <a:font script="Jpan" typeface="游ゴシック Light"/>
+        <a:font script="Hang" typeface="맑은 고딕"/>
+        <a:font script="Hans" typeface="等线 Light"/>
+        <a:font script="Hant" typeface="新細明體"/>
+        <a:font script="Arab" typeface="Times New Roman"/>
+        <a:font script="Hebr" typeface="Times New Roman"/>
+        <a:font script="Thai" typeface="Angsana New"/>
+        <a:font script="Ethi" typeface="Nyala"/>
+        <a:font script="Beng" typeface="Vrinda"/>
+        <a:font script="Gujr" typeface="Shruti"/>
+        <a:font script="Khmr" typeface="MoolBoran"/>
+        <a:font script="Knda" typeface="Tunga"/>
+        <a:font script="Guru" typeface="Raavi"/>
+        <a:font script="Cans" typeface="Euphemia"/>
+        <a:font script="Cher" typeface="Plantagenet Cherokee"/>
+        <a:font script="Yiii" typeface="Microsoft Yi Baiti"/>
+        <a:font script="Tibt" typeface="Microsoft Himalaya"/>
+        <a:font script="Thaa" typeface="MV Boli"/>
+        <a:font script="Deva" typeface="Mangal"/>
+        <a:font script="Telu" typeface="Gautami"/>
+        <a:font script="Taml" typeface="Latha"/>
+        <a:font script="Syrc" typeface="Estrangelo Edessa"/>
+        <a:font script="Orya" typeface="Kalinga"/>
+        <a:font script="Mlym" typeface="Kartika"/>
+        <a:font script="Laoo" typeface="DokChampa"/>
+        <a:font script="Sinh" typeface="Iskoola Pota"/>
+        <a:font script="Mong" typeface="Mongolian Baiti"/>
+        <a:font script="Viet" typeface="Times New Roman"/>
+        <a:font script="Uigh" typeface="Microsoft Uighur"/>
+        <a:font script="Geor" typeface="Sylfaen"/>
+        <a:font script="Armn" typeface="Arial"/>
+        <a:font script="Bugi" typeface="Leelawadee UI"/>
+        <a:font script="Bopo" typeface="Microsoft JhengHei"/>
+        <a:font script="Java" typeface="Javanese Text"/>
+        <a:font script="Lisu" typeface="Segoe UI"/>
+        <a:font script="Mymr" typeface="Myanmar Text"/>
+        <a:font script="Nkoo" typeface="Ebrima"/>
+        <a:font script="Olck" typeface="Nirmala UI"/>
+        <a:font script="Osma" typeface="Ebrima"/>
+        <a:font script="Phag" typeface="Phagspa"/>
+        <a:font script="Syrn" typeface="Estrangelo Edessa"/>
+        <a:font script="Syrj" typeface="Estrangelo Edessa"/>
+        <a:font script="Syre" typeface="Estrangelo Edessa"/>
+        <a:font script="Sora" typeface="Nirmala UI"/>
+        <a:font script="Tale" typeface="Microsoft Tai Le"/>
+        <a:font script="Talu" typeface="Microsoft New Tai Lue"/>
+        <a:font script="Tfng" typeface="Ebrima"/>
+      </a:majorFont>
+      <a:minorFont>
+        <a:latin typeface="Calibri" panose="020F0502020204030204"/>
+        <a:ea typeface=""/>
+        <a:cs typeface=""/>
+        <a:font script="Jpan" typeface="游ゴシック"/>
+        <a:font script="Hang" typeface="맑은 고딕"/>
+        <a:font script="Hans" typeface="等线"/>
+        <a:font script="Hant" typeface="新細明體"/>
+        <a:font script="Arab" typeface="Arial"/>
+        <a:font script="Hebr" typeface="Arial"/>
+        <a:font script="Thai" typeface="Cordia New"/>
+        <a:font script="Ethi" typeface="Nyala"/>
+        <a:font script="Beng" typeface="Vrinda"/>
+        <a:font script="Gujr" typeface="Shruti"/>
+        <a:font script="Khmr" typeface="DaunPenh"/>
+        <a:font script="Knda" typeface="Tunga"/>
+        <a:font script="Guru" typeface="Raavi"/>
+        <a:font script="Cans" typeface="Euphemia"/>
+        <a:font script="Cher" typeface="Plantagenet Cherokee"/>
+        <a:font script="Yiii" typeface="Microsoft Yi Baiti"/>
+        <a:font script="Tibt" typeface="Microsoft Himalaya"/>
+        <a:font script="Thaa" typeface="MV Boli"/>
+        <a:font script="Deva" typeface="Mangal"/>
+        <a:font script="Telu" typeface="Gautami"/>
+        <a:font script="Taml" typeface="Latha"/>
+        <a:font script="Syrc" typeface="Estrangelo Edessa"/>
+        <a:font script="Orya" typeface="Kalinga"/>
+        <a:font script="Mlym" typeface="Kartika"/>
+        <a:font script="Laoo" typeface="DokChampa"/>
+        <a:font script="Sinh" typeface="Iskoola Pota"/>
+        <a:font script="Mong" typeface="Mongolian Baiti"/>
+        <a:font script="Viet" typeface="Arial"/>
+        <a:font script="Uigh" typeface="Microsoft Uighur"/>
+        <a:font script="Geor" typeface="Sylfaen"/>
+        <a:font script="Armn" typeface="Arial"/>
+        <a:font script="Bugi" typeface="Leelawadee UI"/>
+        <a:font script="Bopo" typeface="Microsoft JhengHei"/>
+        <a:font script="Java" typeface="Javanese Text"/>
+        <a:font script="Lisu" typeface="Segoe UI"/>
+        <a:font script="Mymr" typeface="Myanmar Text"/>
+        <a:font script="Nkoo" typeface="Ebrima"/>
+        <a:font script="Olck" typeface="Nirmala UI"/>
+        <a:font script="Osma" typeface="Ebrima"/>
+        <a:font script="Phag" typeface="Phagspa"/>
+        <a:font script="Syrn" typeface="Estrangelo Edessa"/>
+        <a:font script="Syrj" typeface="Estrangelo Edessa"/>
+        <a:font script="Syre" typeface="Estrangelo Edessa"/>
+        <a:font script="Sora" typeface="Nirmala UI"/>
+        <a:font script="Tale" typeface="Microsoft Tai Le"/>
+        <a:font script="Talu" typeface="Microsoft New Tai Lue"/>
+        <a:font script="Tfng" typeface="Ebrima"/>
+      </a:minorFont>
+    </a:fontScheme>
+    <a:fmtScheme name="Office">
+      <a:fillStyleLst>
+        <a:solidFill>
+          <a:schemeClr val="phClr"/>
+        </a:solidFill>
+        <a:gradFill rotWithShape="1">
+          <a:gsLst>
+            <a:gs pos="0">
+              <a:schemeClr val="phClr">
+                <a:lumMod val="110000"/>
+                <a:satMod val="105000"/>
+                <a:tint val="67000"/>
+              </a:schemeClr>
+            </a:gs>
+            <a:gs pos="50000">
+              <a:schemeClr val="phClr">
+                <a:lumMod val="105000"/>
+                <a:satMod val="103000"/>
+                <a:tint val="73000"/>
+              </a:schemeClr>
+            </a:gs>
+            <a:gs pos="100000">
+              <a:schemeClr val="phClr">
+                <a:lumMod val="105000"/>
+                <a:satMod val="109000"/>
+                <a:tint val="81000"/>
+              </a:schemeClr>
+            </a:gs>
+          </a:gsLst>
+          <a:lin ang="5400000" scaled="0"/>
+        </a:gradFill>
+        <a:gradFill rotWithShape="1">
+          <a:gsLst>
+            <a:gs pos="0">
+              <a:schemeClr val="phClr">
+                <a:satMod val="103000"/>
+                <a:lumMod val="102000"/>
+                <a:tint val="94000"/>
+              </a:schemeClr>
+            </a:gs>
+            <a:gs pos="50000">
+              <a:schemeClr val="phClr">
+                <a:satMod val="110000"/>
+                <a:lumMod val="100000"/>
+                <a:shade val="100000"/>
+              </a:schemeClr>
+            </a:gs>
+            <a:gs pos="100000">
+              <a:schemeClr val="phClr">
+                <a:lumMod val="99000"/>
+                <a:satMod val="120000"/>
+                <a:shade val="78000"/>
+              </a:schemeClr>
+            </a:gs>
+          </a:gsLst>
+          <a:lin ang="5400000" scaled="0"/>
+        </a:gradFill>
+      </a:fillStyleLst>
+      <a:lnStyleLst>
+        <a:ln w="6350" cap="flat" cmpd="sng" algn="ctr">
+          <a:solidFill>
+            <a:schemeClr val="phClr"/>
+          </a:solidFill>
+          <a:prstDash val="solid"/>
+          <a:miter lim="800000"/>
+        </a:ln>
+        <a:ln w="12700" cap="flat" cmpd="sng" algn="ctr">
+          <a:solidFill>
+            <a:schemeClr val="phClr"/>
+          </a:solidFill>
+          <a:prstDash val="solid"/>
+          <a:miter lim="800000"/>
+        </a:ln>
+        <a:ln w="19050" cap="flat" cmpd="sng" algn="ctr">
+          <a:solidFill>
+            <a:schemeClr val="phClr"/>
+          </a:solidFill>
+          <a:prstDash val="solid"/>
+          <a:miter lim="800000"/>
+        </a:ln>
+      </a:lnStyleLst>
+      <a:effectStyleLst>
+        <a:effectStyle>
+          <a:effectLst/>
+        </a:effectStyle>
+        <a:effectStyle>
+          <a:effectLst/>
+        </a:effectStyle>
+        <a:effectStyle>
+          <a:effectLst>
+            <a:outerShdw blurRad="57150" dist="19050" dir="5400000" algn="ctr" rotWithShape="0">
+              <a:srgbClr val="000000">
+                <a:alpha val="63000"/>
+              </a:srgbClr>
+            </a:outerShdw>
+          </a:effectLst>
+        </a:effectStyle>
+      </a:effectStyleLst>
+      <a:bgFillStyleLst>
+        <a:solidFill>
+          <a:schemeClr val="phClr"/>
+        </a:solidFill>
+        <a:solidFill>
+          <a:schemeClr val="phClr">
+            <a:tint val="95000"/>
+            <a:satMod val="170000"/>
+          </a:schemeClr>
+        </a:solidFill>
+        <a:gradFill rotWithShape="1">
+          <a:gsLst>
+            <a:gs pos="0">
+              <a:schemeClr val="phClr">
+                <a:tint val="93000"/>
+                <a:satMod val="150000"/>
+                <a:shade val="98000"/>
+                <a:lumMod val="102000"/>
+              </a:schemeClr>
+            </a:gs>
+            <a:gs pos="50000">
+              <a:schemeClr val="phClr">
+                <a:tint val="98000"/>
+                <a:satMod val="130000"/>
+                <a:shade val="90000"/>
+                <a:lumMod val="103000"/>
+              </a:schemeClr>
+            </a:gs>
+            <a:gs pos="100000">
+              <a:schemeClr val="phClr">
+                <a:shade val="63000"/>
+                <a:satMod val="120000"/>
+              </a:schemeClr>
+            </a:gs>
+          </a:gsLst>
+          <a:lin ang="5400000" scaled="0"/>
+        </a:gradFill>
+      </a:bgFillStyleLst>
+    </a:fmtScheme>
+  </a:themeElements>
+  <a:objectDefaults/>
+  <a:extraClrSchemeLst/>
+  <a:extLst>
+    <a:ext uri="{05A4C25C-085E-4340-85A3-A5531E510DB2}">
+      <thm15:themeFamily xmlns:thm15="http://schemas.microsoft.com/office/thememl/2012/main" name="Office Theme" id="{62F939B6-93AF-4DB8-9C6B-D6C7DFDC589F}" vid="{4A3C46E8-61CC-4603-A589-7422A47A8E4A}"/>
+    </a:ext>
+  </a:extLst>
+</a:theme>
 </file>
</xml_diff>

<commit_message>
fixed spelling mistake in presentation
</commit_message>
<xml_diff>
--- a/Presentation/RaspberryReef.pptx
+++ b/Presentation/RaspberryReef.pptx
@@ -9902,19 +9902,7 @@
             </a:pPr>
             <a:r>
               <a:rPr lang="en-US" sz="3600" dirty="0"/>
-              <a:t>Twitter </a:t>
-            </a:r>
-            <a:r>
-              <a:rPr lang="en-US" sz="3600" dirty="0" err="1"/>
-              <a:t>Oauth</a:t>
-            </a:r>
-            <a:r>
-              <a:rPr lang="en-US" sz="3600" dirty="0"/>
-              <a:t> 1.0 </a:t>
-            </a:r>
-            <a:r>
-              <a:rPr lang="en-US" sz="3600" dirty="0" err="1"/>
-              <a:t>authentificaiton</a:t>
+              <a:t>Twitter OAuth 1.0 authentication</a:t>
             </a:r>
             <a:endParaRPr lang="de-CH" sz="3600" dirty="0"/>
           </a:p>

</xml_diff>